<commit_message>
Updating presentation to Danish
</commit_message>
<xml_diff>
--- a/syseng_hwco/proj/Artifact/Presentations/Presentation_11_02_11.pptx
+++ b/syseng_hwco/proj/Artifact/Presentations/Presentation_11_02_11.pptx
@@ -295,7 +295,7 @@
             <a:fld id="{416418D9-DF11-407D-B96D-4C5DFC0F3360}" type="datetimeFigureOut">
               <a:rPr lang="da-DK" smtClean="0"/>
               <a:pPr/>
-              <a:t>07-02-2011</a:t>
+              <a:t>08-02-2011</a:t>
             </a:fld>
             <a:endParaRPr lang="da-DK"/>
           </a:p>
@@ -462,7 +462,7 @@
             <a:fld id="{416418D9-DF11-407D-B96D-4C5DFC0F3360}" type="datetimeFigureOut">
               <a:rPr lang="da-DK" smtClean="0"/>
               <a:pPr/>
-              <a:t>07-02-2011</a:t>
+              <a:t>08-02-2011</a:t>
             </a:fld>
             <a:endParaRPr lang="da-DK"/>
           </a:p>
@@ -639,7 +639,7 @@
             <a:fld id="{416418D9-DF11-407D-B96D-4C5DFC0F3360}" type="datetimeFigureOut">
               <a:rPr lang="da-DK" smtClean="0"/>
               <a:pPr/>
-              <a:t>07-02-2011</a:t>
+              <a:t>08-02-2011</a:t>
             </a:fld>
             <a:endParaRPr lang="da-DK"/>
           </a:p>
@@ -806,7 +806,7 @@
             <a:fld id="{416418D9-DF11-407D-B96D-4C5DFC0F3360}" type="datetimeFigureOut">
               <a:rPr lang="da-DK" smtClean="0"/>
               <a:pPr/>
-              <a:t>07-02-2011</a:t>
+              <a:t>08-02-2011</a:t>
             </a:fld>
             <a:endParaRPr lang="da-DK"/>
           </a:p>
@@ -1049,7 +1049,7 @@
             <a:fld id="{416418D9-DF11-407D-B96D-4C5DFC0F3360}" type="datetimeFigureOut">
               <a:rPr lang="da-DK" smtClean="0"/>
               <a:pPr/>
-              <a:t>07-02-2011</a:t>
+              <a:t>08-02-2011</a:t>
             </a:fld>
             <a:endParaRPr lang="da-DK"/>
           </a:p>
@@ -1334,7 +1334,7 @@
             <a:fld id="{416418D9-DF11-407D-B96D-4C5DFC0F3360}" type="datetimeFigureOut">
               <a:rPr lang="da-DK" smtClean="0"/>
               <a:pPr/>
-              <a:t>07-02-2011</a:t>
+              <a:t>08-02-2011</a:t>
             </a:fld>
             <a:endParaRPr lang="da-DK"/>
           </a:p>
@@ -1753,7 +1753,7 @@
             <a:fld id="{416418D9-DF11-407D-B96D-4C5DFC0F3360}" type="datetimeFigureOut">
               <a:rPr lang="da-DK" smtClean="0"/>
               <a:pPr/>
-              <a:t>07-02-2011</a:t>
+              <a:t>08-02-2011</a:t>
             </a:fld>
             <a:endParaRPr lang="da-DK"/>
           </a:p>
@@ -1868,7 +1868,7 @@
             <a:fld id="{416418D9-DF11-407D-B96D-4C5DFC0F3360}" type="datetimeFigureOut">
               <a:rPr lang="da-DK" smtClean="0"/>
               <a:pPr/>
-              <a:t>07-02-2011</a:t>
+              <a:t>08-02-2011</a:t>
             </a:fld>
             <a:endParaRPr lang="da-DK"/>
           </a:p>
@@ -1960,7 +1960,7 @@
             <a:fld id="{416418D9-DF11-407D-B96D-4C5DFC0F3360}" type="datetimeFigureOut">
               <a:rPr lang="da-DK" smtClean="0"/>
               <a:pPr/>
-              <a:t>07-02-2011</a:t>
+              <a:t>08-02-2011</a:t>
             </a:fld>
             <a:endParaRPr lang="da-DK"/>
           </a:p>
@@ -2234,7 +2234,7 @@
             <a:fld id="{416418D9-DF11-407D-B96D-4C5DFC0F3360}" type="datetimeFigureOut">
               <a:rPr lang="da-DK" smtClean="0"/>
               <a:pPr/>
-              <a:t>07-02-2011</a:t>
+              <a:t>08-02-2011</a:t>
             </a:fld>
             <a:endParaRPr lang="da-DK"/>
           </a:p>
@@ -2484,7 +2484,7 @@
             <a:fld id="{416418D9-DF11-407D-B96D-4C5DFC0F3360}" type="datetimeFigureOut">
               <a:rPr lang="da-DK" smtClean="0"/>
               <a:pPr/>
-              <a:t>07-02-2011</a:t>
+              <a:t>08-02-2011</a:t>
             </a:fld>
             <a:endParaRPr lang="da-DK"/>
           </a:p>
@@ -2694,7 +2694,7 @@
             <a:fld id="{416418D9-DF11-407D-B96D-4C5DFC0F3360}" type="datetimeFigureOut">
               <a:rPr lang="da-DK" smtClean="0"/>
               <a:pPr/>
-              <a:t>07-02-2011</a:t>
+              <a:t>08-02-2011</a:t>
             </a:fld>
             <a:endParaRPr lang="da-DK"/>
           </a:p>
@@ -3120,48 +3120,9 @@
           <a:lstStyle/>
           <a:p>
             <a:r>
-              <a:rPr lang="da-DK" dirty="0" err="1" smtClean="0"/>
-              <a:t>Safety</a:t>
-            </a:r>
-            <a:r>
-              <a:rPr lang="da-DK" dirty="0"/>
-              <a:t> </a:t>
-            </a:r>
-            <a:r>
               <a:rPr lang="da-DK" dirty="0" smtClean="0"/>
-              <a:t>and </a:t>
-            </a:r>
-            <a:r>
-              <a:rPr lang="da-DK" dirty="0" err="1" smtClean="0"/>
-              <a:t>Simplicity</a:t>
-            </a:r>
-            <a:r>
-              <a:rPr lang="da-DK" dirty="0" smtClean="0"/>
-              <a:t>, </a:t>
-            </a:r>
-          </a:p>
-          <a:p>
-            <a:r>
-              <a:rPr lang="da-DK" dirty="0" smtClean="0"/>
-              <a:t>the </a:t>
-            </a:r>
-            <a:r>
-              <a:rPr lang="da-DK" dirty="0" err="1" smtClean="0"/>
-              <a:t>elderly</a:t>
-            </a:r>
-            <a:r>
-              <a:rPr lang="da-DK" dirty="0" smtClean="0"/>
-              <a:t> </a:t>
-            </a:r>
-            <a:r>
-              <a:rPr lang="da-DK" dirty="0" err="1" smtClean="0"/>
-              <a:t>can</a:t>
-            </a:r>
-            <a:r>
-              <a:rPr lang="da-DK" dirty="0" smtClean="0"/>
-              <a:t> have it all!</a:t>
-            </a:r>
-            <a:endParaRPr lang="da-DK" dirty="0"/>
+              <a:t>Stabilt og simpelt</a:t>
+            </a:r>
           </a:p>
         </p:txBody>
       </p:sp>
@@ -3206,16 +3167,8 @@
           <a:lstStyle/>
           <a:p>
             <a:r>
-              <a:rPr lang="da-DK" dirty="0" err="1" smtClean="0"/>
-              <a:t>Today’s</a:t>
-            </a:r>
-            <a:r>
               <a:rPr lang="da-DK" dirty="0" smtClean="0"/>
-              <a:t> </a:t>
-            </a:r>
-            <a:r>
-              <a:rPr lang="da-DK" dirty="0" err="1" smtClean="0"/>
-              <a:t>world</a:t>
+              <a:t>I dag</a:t>
             </a:r>
             <a:endParaRPr lang="da-DK" dirty="0"/>
           </a:p>
@@ -3295,7 +3248,7 @@
           <a:p>
             <a:r>
               <a:rPr lang="da-DK" dirty="0" smtClean="0"/>
-              <a:t>Problems?</a:t>
+              <a:t>Problemer?</a:t>
             </a:r>
             <a:endParaRPr lang="da-DK" dirty="0"/>
           </a:p>
@@ -3318,43 +3271,16 @@
           <a:p>
             <a:r>
               <a:rPr lang="da-DK" dirty="0" smtClean="0"/>
-              <a:t>The speaker and the person is in </a:t>
-            </a:r>
-            <a:r>
-              <a:rPr lang="da-DK" dirty="0" err="1" smtClean="0"/>
-              <a:t>different</a:t>
-            </a:r>
+              <a:t>Højtaler/mikrofon er ikke i samme rum som personen der har brug for hjælp</a:t>
+            </a:r>
+            <a:endParaRPr lang="da-DK" dirty="0" smtClean="0"/>
+          </a:p>
+          <a:p>
             <a:r>
               <a:rPr lang="da-DK" dirty="0" smtClean="0"/>
-              <a:t> </a:t>
-            </a:r>
-            <a:r>
-              <a:rPr lang="da-DK" dirty="0" err="1" smtClean="0"/>
-              <a:t>rooms</a:t>
+              <a:t>Systemet kræver en fastnet forbindelse (dyr)</a:t>
             </a:r>
             <a:endParaRPr lang="da-DK" dirty="0" smtClean="0"/>
-          </a:p>
-          <a:p>
-            <a:r>
-              <a:rPr lang="da-DK" dirty="0" smtClean="0"/>
-              <a:t>The system </a:t>
-            </a:r>
-            <a:r>
-              <a:rPr lang="da-DK" dirty="0" err="1" smtClean="0"/>
-              <a:t>requires</a:t>
-            </a:r>
-            <a:r>
-              <a:rPr lang="da-DK" dirty="0" smtClean="0"/>
-              <a:t> a land-line (</a:t>
-            </a:r>
-            <a:r>
-              <a:rPr lang="da-DK" dirty="0" err="1" smtClean="0"/>
-              <a:t>expensive</a:t>
-            </a:r>
-            <a:r>
-              <a:rPr lang="da-DK" dirty="0" smtClean="0"/>
-              <a:t>)</a:t>
-            </a:r>
           </a:p>
           <a:p>
             <a:pPr>
@@ -3406,7 +3332,7 @@
           <a:p>
             <a:r>
               <a:rPr lang="da-DK" dirty="0" smtClean="0"/>
-              <a:t>Solution</a:t>
+              <a:t>Løsning</a:t>
             </a:r>
             <a:endParaRPr lang="da-DK" dirty="0"/>
           </a:p>
@@ -3428,62 +3354,23 @@
           <a:lstStyle/>
           <a:p>
             <a:r>
+              <a:rPr lang="da-DK" dirty="0" smtClean="0"/>
+              <a:t>Flyt højtaler og mikrofon til ”knappen”.</a:t>
+            </a:r>
+            <a:endParaRPr lang="da-DK" dirty="0" smtClean="0"/>
+          </a:p>
+          <a:p>
+            <a:r>
+              <a:rPr lang="da-DK" dirty="0" smtClean="0"/>
+              <a:t>Anvend en alternativ (eksisterende) </a:t>
+            </a:r>
+            <a:r>
               <a:rPr lang="da-DK" dirty="0" err="1" smtClean="0"/>
-              <a:t>Move</a:t>
-            </a:r>
-            <a:r>
-              <a:rPr lang="da-DK" dirty="0" smtClean="0"/>
-              <a:t> the speaker and </a:t>
-            </a:r>
-            <a:r>
-              <a:rPr lang="da-DK" dirty="0" err="1" smtClean="0"/>
-              <a:t>microphone</a:t>
-            </a:r>
-            <a:r>
-              <a:rPr lang="da-DK" dirty="0" smtClean="0"/>
-              <a:t> to the </a:t>
-            </a:r>
-            <a:r>
-              <a:rPr lang="da-DK" dirty="0" err="1" smtClean="0"/>
-              <a:t>button</a:t>
+              <a:t>kommunikationslinie</a:t>
             </a:r>
             <a:r>
               <a:rPr lang="da-DK" dirty="0" smtClean="0"/>
               <a:t>.</a:t>
-            </a:r>
-          </a:p>
-          <a:p>
-            <a:r>
-              <a:rPr lang="da-DK" dirty="0" err="1" smtClean="0"/>
-              <a:t>Use</a:t>
-            </a:r>
-            <a:r>
-              <a:rPr lang="da-DK" dirty="0" smtClean="0"/>
-              <a:t> an </a:t>
-            </a:r>
-            <a:r>
-              <a:rPr lang="da-DK" dirty="0" err="1" smtClean="0"/>
-              <a:t>alternate</a:t>
-            </a:r>
-            <a:r>
-              <a:rPr lang="da-DK" dirty="0" smtClean="0"/>
-              <a:t> (</a:t>
-            </a:r>
-            <a:r>
-              <a:rPr lang="da-DK" dirty="0" err="1" smtClean="0"/>
-              <a:t>existing</a:t>
-            </a:r>
-            <a:r>
-              <a:rPr lang="da-DK" dirty="0" smtClean="0"/>
-              <a:t>) </a:t>
-            </a:r>
-            <a:r>
-              <a:rPr lang="da-DK" dirty="0" err="1" smtClean="0"/>
-              <a:t>communication</a:t>
-            </a:r>
-            <a:r>
-              <a:rPr lang="da-DK" dirty="0" smtClean="0"/>
-              <a:t> line.</a:t>
             </a:r>
             <a:endParaRPr lang="da-DK" dirty="0"/>
           </a:p>
@@ -3645,20 +3532,18 @@
         </p:nvSpPr>
         <p:spPr/>
         <p:txBody>
-          <a:bodyPr/>
-          <a:lstStyle/>
-          <a:p>
+          <a:bodyPr>
+            <a:normAutofit lnSpcReduction="10000"/>
+          </a:bodyPr>
+          <a:lstStyle/>
+          <a:p>
+            <a:r>
+              <a:rPr lang="da-DK" dirty="0" smtClean="0"/>
+              <a:t>Batteriet skal kunne håndtere </a:t>
+            </a:r>
             <a:r>
               <a:rPr lang="da-DK" dirty="0" err="1" smtClean="0"/>
-              <a:t>Battery</a:t>
-            </a:r>
-            <a:r>
-              <a:rPr lang="da-DK" dirty="0" smtClean="0"/>
-              <a:t> must support </a:t>
-            </a:r>
-            <a:r>
-              <a:rPr lang="da-DK" dirty="0" err="1" smtClean="0"/>
-              <a:t>two-way</a:t>
+              <a:t>to-vejs</a:t>
             </a:r>
             <a:r>
               <a:rPr lang="da-DK" dirty="0" smtClean="0"/>
@@ -3666,7 +3551,7 @@
             </a:r>
             <a:r>
               <a:rPr lang="da-DK" dirty="0" err="1" smtClean="0"/>
-              <a:t>Audio</a:t>
+              <a:t>audio</a:t>
             </a:r>
             <a:endParaRPr lang="da-DK" dirty="0" smtClean="0"/>
           </a:p>
@@ -3674,186 +3559,32 @@
             <a:pPr lvl="1"/>
             <a:r>
               <a:rPr lang="da-DK" dirty="0" smtClean="0"/>
-              <a:t>Old type </a:t>
-            </a:r>
-            <a:r>
-              <a:rPr lang="da-DK" dirty="0" err="1" smtClean="0"/>
-              <a:t>can</a:t>
-            </a:r>
+              <a:t>Den gammeldags type holder mindst 5 år på 1 batteri</a:t>
+            </a:r>
+            <a:endParaRPr lang="da-DK" dirty="0" smtClean="0"/>
+          </a:p>
+          <a:p>
             <a:r>
               <a:rPr lang="da-DK" dirty="0" smtClean="0"/>
-              <a:t> last 5 </a:t>
-            </a:r>
-            <a:r>
-              <a:rPr lang="da-DK" dirty="0" err="1" smtClean="0"/>
-              <a:t>years</a:t>
+              <a:t>Ældre og specielt demente kan have svært ved </a:t>
             </a:r>
             <a:r>
               <a:rPr lang="da-DK" dirty="0" smtClean="0"/>
-              <a:t> </a:t>
-            </a:r>
-            <a:r>
-              <a:rPr lang="da-DK" dirty="0" err="1" smtClean="0"/>
-              <a:t>on</a:t>
-            </a:r>
+              <a:t>at huske at genoplade batterierne.</a:t>
+            </a:r>
+          </a:p>
+          <a:p>
             <a:r>
               <a:rPr lang="da-DK" dirty="0" smtClean="0"/>
-              <a:t> a single </a:t>
-            </a:r>
-            <a:r>
-              <a:rPr lang="da-DK" dirty="0" err="1" smtClean="0"/>
-              <a:t>battery</a:t>
+              <a:t>Det skal være meget enkelt at oplade ”knappen”</a:t>
             </a:r>
             <a:endParaRPr lang="da-DK" dirty="0" smtClean="0"/>
           </a:p>
           <a:p>
             <a:r>
-              <a:rPr lang="da-DK" dirty="0" err="1" smtClean="0"/>
-              <a:t>Elderly</a:t>
-            </a:r>
-            <a:r>
               <a:rPr lang="da-DK" dirty="0" smtClean="0"/>
-              <a:t> and </a:t>
-            </a:r>
-            <a:r>
-              <a:rPr lang="da-DK" dirty="0" err="1" smtClean="0"/>
-              <a:t>especially</a:t>
-            </a:r>
-            <a:r>
-              <a:rPr lang="da-DK" dirty="0" smtClean="0"/>
-              <a:t> senile </a:t>
-            </a:r>
-            <a:r>
-              <a:rPr lang="da-DK" dirty="0" err="1" smtClean="0"/>
-              <a:t>may</a:t>
-            </a:r>
-            <a:r>
-              <a:rPr lang="da-DK" dirty="0" smtClean="0"/>
-              <a:t> have a problem </a:t>
-            </a:r>
-            <a:r>
-              <a:rPr lang="da-DK" dirty="0" err="1" smtClean="0"/>
-              <a:t>remembering</a:t>
-            </a:r>
-            <a:r>
-              <a:rPr lang="da-DK" dirty="0" smtClean="0"/>
-              <a:t> to </a:t>
-            </a:r>
-            <a:r>
-              <a:rPr lang="da-DK" dirty="0" err="1" smtClean="0"/>
-              <a:t>recharge</a:t>
-            </a:r>
-            <a:r>
-              <a:rPr lang="da-DK" dirty="0" smtClean="0"/>
-              <a:t> the unit.</a:t>
-            </a:r>
-          </a:p>
-          <a:p>
-            <a:r>
-              <a:rPr lang="da-DK" dirty="0" smtClean="0"/>
-              <a:t>Speaker must </a:t>
-            </a:r>
-            <a:r>
-              <a:rPr lang="da-DK" dirty="0" err="1" smtClean="0"/>
-              <a:t>be</a:t>
-            </a:r>
-            <a:r>
-              <a:rPr lang="da-DK" dirty="0" smtClean="0"/>
-              <a:t> </a:t>
-            </a:r>
-            <a:r>
-              <a:rPr lang="da-DK" dirty="0" err="1" smtClean="0"/>
-              <a:t>strong</a:t>
-            </a:r>
-            <a:r>
-              <a:rPr lang="da-DK" dirty="0" smtClean="0"/>
-              <a:t> </a:t>
-            </a:r>
-            <a:r>
-              <a:rPr lang="da-DK" dirty="0" err="1" smtClean="0"/>
-              <a:t>enough</a:t>
-            </a:r>
-            <a:r>
-              <a:rPr lang="da-DK" dirty="0" smtClean="0"/>
-              <a:t> to </a:t>
-            </a:r>
-            <a:r>
-              <a:rPr lang="da-DK" dirty="0" err="1" smtClean="0"/>
-              <a:t>be</a:t>
-            </a:r>
-            <a:r>
-              <a:rPr lang="da-DK" dirty="0" smtClean="0"/>
-              <a:t> </a:t>
-            </a:r>
-            <a:r>
-              <a:rPr lang="da-DK" dirty="0" err="1" smtClean="0"/>
-              <a:t>heard</a:t>
-            </a:r>
-            <a:r>
-              <a:rPr lang="da-DK" dirty="0" smtClean="0"/>
-              <a:t> by </a:t>
-            </a:r>
-            <a:r>
-              <a:rPr lang="da-DK" dirty="0" err="1" smtClean="0"/>
-              <a:t>elderly</a:t>
-            </a:r>
-            <a:endParaRPr lang="da-DK" dirty="0" smtClean="0"/>
-          </a:p>
-          <a:p>
-            <a:pPr lvl="1"/>
-            <a:r>
-              <a:rPr lang="da-DK" dirty="0" smtClean="0"/>
-              <a:t>Teleslynge </a:t>
-            </a:r>
-            <a:r>
-              <a:rPr lang="da-DK" dirty="0" err="1" smtClean="0"/>
-              <a:t>may</a:t>
-            </a:r>
-            <a:r>
-              <a:rPr lang="da-DK" dirty="0" smtClean="0"/>
-              <a:t> </a:t>
-            </a:r>
-            <a:r>
-              <a:rPr lang="da-DK" dirty="0" err="1" smtClean="0"/>
-              <a:t>be</a:t>
-            </a:r>
-            <a:r>
-              <a:rPr lang="da-DK" dirty="0" smtClean="0"/>
-              <a:t> </a:t>
-            </a:r>
-            <a:r>
-              <a:rPr lang="da-DK" dirty="0" err="1" smtClean="0"/>
-              <a:t>used</a:t>
-            </a:r>
-            <a:r>
-              <a:rPr lang="da-DK" dirty="0" smtClean="0"/>
-              <a:t> </a:t>
-            </a:r>
-            <a:r>
-              <a:rPr lang="da-DK" dirty="0" err="1" smtClean="0"/>
-              <a:t>with</a:t>
-            </a:r>
-            <a:r>
-              <a:rPr lang="da-DK" dirty="0" smtClean="0"/>
-              <a:t> </a:t>
-            </a:r>
-            <a:r>
-              <a:rPr lang="da-DK" dirty="0" err="1" smtClean="0"/>
-              <a:t>hearing</a:t>
-            </a:r>
-            <a:r>
-              <a:rPr lang="da-DK" dirty="0" smtClean="0"/>
-              <a:t> </a:t>
-            </a:r>
-            <a:r>
-              <a:rPr lang="da-DK" dirty="0" err="1" smtClean="0"/>
-              <a:t>aid</a:t>
-            </a:r>
-            <a:r>
-              <a:rPr lang="da-DK" dirty="0" smtClean="0"/>
-              <a:t> (future)</a:t>
-            </a:r>
-            <a:endParaRPr lang="da-DK" dirty="0"/>
+              <a:t>Højtalerne skal være stærke nok til at lyden kan høres af de ældre.</a:t>
+            </a:r>
           </a:p>
         </p:txBody>
       </p:sp>

</xml_diff>

<commit_message>
Updating presentation and requirements
</commit_message>
<xml_diff>
--- a/syseng_hwco/proj/Artifact/Presentations/Presentation_11_02_11.pptx
+++ b/syseng_hwco/proj/Artifact/Presentations/Presentation_11_02_11.pptx
@@ -12,6 +12,10 @@
     <p:sldId id="260" r:id="rId6"/>
     <p:sldId id="261" r:id="rId7"/>
     <p:sldId id="262" r:id="rId8"/>
+    <p:sldId id="263" r:id="rId9"/>
+    <p:sldId id="264" r:id="rId10"/>
+    <p:sldId id="265" r:id="rId11"/>
+    <p:sldId id="266" r:id="rId12"/>
   </p:sldIdLst>
   <p:sldSz cx="9144000" cy="6858000" type="screen4x3"/>
   <p:notesSz cx="6858000" cy="9144000"/>
@@ -295,7 +299,7 @@
             <a:fld id="{416418D9-DF11-407D-B96D-4C5DFC0F3360}" type="datetimeFigureOut">
               <a:rPr lang="da-DK" smtClean="0"/>
               <a:pPr/>
-              <a:t>08-02-2011</a:t>
+              <a:t>09-02-2011</a:t>
             </a:fld>
             <a:endParaRPr lang="da-DK"/>
           </a:p>
@@ -462,7 +466,7 @@
             <a:fld id="{416418D9-DF11-407D-B96D-4C5DFC0F3360}" type="datetimeFigureOut">
               <a:rPr lang="da-DK" smtClean="0"/>
               <a:pPr/>
-              <a:t>08-02-2011</a:t>
+              <a:t>09-02-2011</a:t>
             </a:fld>
             <a:endParaRPr lang="da-DK"/>
           </a:p>
@@ -639,7 +643,7 @@
             <a:fld id="{416418D9-DF11-407D-B96D-4C5DFC0F3360}" type="datetimeFigureOut">
               <a:rPr lang="da-DK" smtClean="0"/>
               <a:pPr/>
-              <a:t>08-02-2011</a:t>
+              <a:t>09-02-2011</a:t>
             </a:fld>
             <a:endParaRPr lang="da-DK"/>
           </a:p>
@@ -806,7 +810,7 @@
             <a:fld id="{416418D9-DF11-407D-B96D-4C5DFC0F3360}" type="datetimeFigureOut">
               <a:rPr lang="da-DK" smtClean="0"/>
               <a:pPr/>
-              <a:t>08-02-2011</a:t>
+              <a:t>09-02-2011</a:t>
             </a:fld>
             <a:endParaRPr lang="da-DK"/>
           </a:p>
@@ -1049,7 +1053,7 @@
             <a:fld id="{416418D9-DF11-407D-B96D-4C5DFC0F3360}" type="datetimeFigureOut">
               <a:rPr lang="da-DK" smtClean="0"/>
               <a:pPr/>
-              <a:t>08-02-2011</a:t>
+              <a:t>09-02-2011</a:t>
             </a:fld>
             <a:endParaRPr lang="da-DK"/>
           </a:p>
@@ -1334,7 +1338,7 @@
             <a:fld id="{416418D9-DF11-407D-B96D-4C5DFC0F3360}" type="datetimeFigureOut">
               <a:rPr lang="da-DK" smtClean="0"/>
               <a:pPr/>
-              <a:t>08-02-2011</a:t>
+              <a:t>09-02-2011</a:t>
             </a:fld>
             <a:endParaRPr lang="da-DK"/>
           </a:p>
@@ -1753,7 +1757,7 @@
             <a:fld id="{416418D9-DF11-407D-B96D-4C5DFC0F3360}" type="datetimeFigureOut">
               <a:rPr lang="da-DK" smtClean="0"/>
               <a:pPr/>
-              <a:t>08-02-2011</a:t>
+              <a:t>09-02-2011</a:t>
             </a:fld>
             <a:endParaRPr lang="da-DK"/>
           </a:p>
@@ -1868,7 +1872,7 @@
             <a:fld id="{416418D9-DF11-407D-B96D-4C5DFC0F3360}" type="datetimeFigureOut">
               <a:rPr lang="da-DK" smtClean="0"/>
               <a:pPr/>
-              <a:t>08-02-2011</a:t>
+              <a:t>09-02-2011</a:t>
             </a:fld>
             <a:endParaRPr lang="da-DK"/>
           </a:p>
@@ -1960,7 +1964,7 @@
             <a:fld id="{416418D9-DF11-407D-B96D-4C5DFC0F3360}" type="datetimeFigureOut">
               <a:rPr lang="da-DK" smtClean="0"/>
               <a:pPr/>
-              <a:t>08-02-2011</a:t>
+              <a:t>09-02-2011</a:t>
             </a:fld>
             <a:endParaRPr lang="da-DK"/>
           </a:p>
@@ -2234,7 +2238,7 @@
             <a:fld id="{416418D9-DF11-407D-B96D-4C5DFC0F3360}" type="datetimeFigureOut">
               <a:rPr lang="da-DK" smtClean="0"/>
               <a:pPr/>
-              <a:t>08-02-2011</a:t>
+              <a:t>09-02-2011</a:t>
             </a:fld>
             <a:endParaRPr lang="da-DK"/>
           </a:p>
@@ -2484,7 +2488,7 @@
             <a:fld id="{416418D9-DF11-407D-B96D-4C5DFC0F3360}" type="datetimeFigureOut">
               <a:rPr lang="da-DK" smtClean="0"/>
               <a:pPr/>
-              <a:t>08-02-2011</a:t>
+              <a:t>09-02-2011</a:t>
             </a:fld>
             <a:endParaRPr lang="da-DK"/>
           </a:p>
@@ -2694,7 +2698,7 @@
             <a:fld id="{416418D9-DF11-407D-B96D-4C5DFC0F3360}" type="datetimeFigureOut">
               <a:rPr lang="da-DK" smtClean="0"/>
               <a:pPr/>
-              <a:t>08-02-2011</a:t>
+              <a:t>09-02-2011</a:t>
             </a:fld>
             <a:endParaRPr lang="da-DK"/>
           </a:p>
@@ -3134,6 +3138,172 @@
 </p:sld>
 </file>
 
+<file path=ppt/slides/slide10.xml><?xml version="1.0" encoding="utf-8"?>
+<p:sld xmlns:a="http://schemas.openxmlformats.org/drawingml/2006/main" xmlns:r="http://schemas.openxmlformats.org/officeDocument/2006/relationships" xmlns:p="http://schemas.openxmlformats.org/presentationml/2006/main">
+  <p:cSld>
+    <p:spTree>
+      <p:nvGrpSpPr>
+        <p:cNvPr id="1" name=""/>
+        <p:cNvGrpSpPr/>
+        <p:nvPr/>
+      </p:nvGrpSpPr>
+      <p:grpSpPr>
+        <a:xfrm>
+          <a:off x="0" y="0"/>
+          <a:ext cx="0" cy="0"/>
+          <a:chOff x="0" y="0"/>
+          <a:chExt cx="0" cy="0"/>
+        </a:xfrm>
+      </p:grpSpPr>
+      <p:sp>
+        <p:nvSpPr>
+          <p:cNvPr id="2" name="Titel 1"/>
+          <p:cNvSpPr>
+            <a:spLocks noGrp="1"/>
+          </p:cNvSpPr>
+          <p:nvPr>
+            <p:ph type="title"/>
+          </p:nvPr>
+        </p:nvSpPr>
+        <p:spPr/>
+        <p:txBody>
+          <a:bodyPr/>
+          <a:lstStyle/>
+          <a:p>
+            <a:r>
+              <a:rPr lang="da-DK" dirty="0" err="1" smtClean="0"/>
+              <a:t>Læringsmålet</a:t>
+            </a:r>
+            <a:endParaRPr lang="da-DK" dirty="0"/>
+          </a:p>
+        </p:txBody>
+      </p:sp>
+      <p:sp>
+        <p:nvSpPr>
+          <p:cNvPr id="3" name="Pladsholder til indhold 2"/>
+          <p:cNvSpPr>
+            <a:spLocks noGrp="1"/>
+          </p:cNvSpPr>
+          <p:nvPr>
+            <p:ph idx="1"/>
+          </p:nvPr>
+        </p:nvSpPr>
+        <p:spPr/>
+        <p:txBody>
+          <a:bodyPr/>
+          <a:lstStyle/>
+          <a:p>
+            <a:r>
+              <a:rPr lang="da-DK" dirty="0" smtClean="0"/>
+              <a:t>???</a:t>
+            </a:r>
+            <a:endParaRPr lang="da-DK" dirty="0"/>
+          </a:p>
+        </p:txBody>
+      </p:sp>
+    </p:spTree>
+  </p:cSld>
+  <p:clrMapOvr>
+    <a:masterClrMapping/>
+  </p:clrMapOvr>
+</p:sld>
+</file>
+
+<file path=ppt/slides/slide11.xml><?xml version="1.0" encoding="utf-8"?>
+<p:sld xmlns:a="http://schemas.openxmlformats.org/drawingml/2006/main" xmlns:r="http://schemas.openxmlformats.org/officeDocument/2006/relationships" xmlns:p="http://schemas.openxmlformats.org/presentationml/2006/main">
+  <p:cSld>
+    <p:spTree>
+      <p:nvGrpSpPr>
+        <p:cNvPr id="1" name=""/>
+        <p:cNvGrpSpPr/>
+        <p:nvPr/>
+      </p:nvGrpSpPr>
+      <p:grpSpPr>
+        <a:xfrm>
+          <a:off x="0" y="0"/>
+          <a:ext cx="0" cy="0"/>
+          <a:chOff x="0" y="0"/>
+          <a:chExt cx="0" cy="0"/>
+        </a:xfrm>
+      </p:grpSpPr>
+      <p:sp>
+        <p:nvSpPr>
+          <p:cNvPr id="2" name="Titel 1"/>
+          <p:cNvSpPr>
+            <a:spLocks noGrp="1"/>
+          </p:cNvSpPr>
+          <p:nvPr>
+            <p:ph type="title"/>
+          </p:nvPr>
+        </p:nvSpPr>
+        <p:spPr/>
+        <p:txBody>
+          <a:bodyPr/>
+          <a:lstStyle/>
+          <a:p>
+            <a:r>
+              <a:rPr lang="da-DK" dirty="0" smtClean="0"/>
+              <a:t>Status</a:t>
+            </a:r>
+            <a:endParaRPr lang="da-DK" dirty="0"/>
+          </a:p>
+        </p:txBody>
+      </p:sp>
+      <p:sp>
+        <p:nvSpPr>
+          <p:cNvPr id="3" name="Pladsholder til indhold 2"/>
+          <p:cNvSpPr>
+            <a:spLocks noGrp="1"/>
+          </p:cNvSpPr>
+          <p:nvPr>
+            <p:ph idx="1"/>
+          </p:nvPr>
+        </p:nvSpPr>
+        <p:spPr/>
+        <p:txBody>
+          <a:bodyPr/>
+          <a:lstStyle/>
+          <a:p>
+            <a:r>
+              <a:rPr lang="da-DK" dirty="0" smtClean="0"/>
+              <a:t>Krav færdige (se </a:t>
+            </a:r>
+            <a:r>
+              <a:rPr lang="da-DK" dirty="0" err="1" smtClean="0"/>
+              <a:t>use-case</a:t>
+            </a:r>
+            <a:r>
+              <a:rPr lang="da-DK" dirty="0" smtClean="0"/>
+              <a:t> diagram på næste slide)</a:t>
+            </a:r>
+          </a:p>
+          <a:p>
+            <a:r>
+              <a:rPr lang="da-DK" dirty="0" smtClean="0"/>
+              <a:t>Arkitektur design undervejs (se diagrammer </a:t>
+            </a:r>
+            <a:r>
+              <a:rPr lang="da-DK" smtClean="0"/>
+              <a:t>på efterfølgende </a:t>
+            </a:r>
+            <a:r>
+              <a:rPr lang="da-DK" dirty="0" smtClean="0"/>
+              <a:t>slides)</a:t>
+            </a:r>
+          </a:p>
+          <a:p>
+            <a:endParaRPr lang="da-DK" dirty="0"/>
+          </a:p>
+        </p:txBody>
+      </p:sp>
+    </p:spTree>
+  </p:cSld>
+  <p:clrMapOvr>
+    <a:masterClrMapping/>
+  </p:clrMapOvr>
+</p:sld>
+</file>
+
 <file path=ppt/slides/slide2.xml><?xml version="1.0" encoding="utf-8"?>
 <p:sld xmlns:a="http://schemas.openxmlformats.org/drawingml/2006/main" xmlns:r="http://schemas.openxmlformats.org/officeDocument/2006/relationships" xmlns:p="http://schemas.openxmlformats.org/presentationml/2006/main">
   <p:cSld>
@@ -3273,14 +3443,12 @@
               <a:rPr lang="da-DK" dirty="0" smtClean="0"/>
               <a:t>Højtaler/mikrofon er ikke i samme rum som personen der har brug for hjælp</a:t>
             </a:r>
-            <a:endParaRPr lang="da-DK" dirty="0" smtClean="0"/>
           </a:p>
           <a:p>
             <a:r>
               <a:rPr lang="da-DK" dirty="0" smtClean="0"/>
               <a:t>Systemet kræver en fastnet forbindelse (dyr)</a:t>
             </a:r>
-            <a:endParaRPr lang="da-DK" dirty="0" smtClean="0"/>
           </a:p>
           <a:p>
             <a:pPr>
@@ -3357,7 +3525,6 @@
               <a:rPr lang="da-DK" dirty="0" smtClean="0"/>
               <a:t>Flyt højtaler og mikrofon til ”knappen”.</a:t>
             </a:r>
-            <a:endParaRPr lang="da-DK" dirty="0" smtClean="0"/>
           </a:p>
           <a:p>
             <a:r>
@@ -3561,16 +3728,11 @@
               <a:rPr lang="da-DK" dirty="0" smtClean="0"/>
               <a:t>Den gammeldags type holder mindst 5 år på 1 batteri</a:t>
             </a:r>
-            <a:endParaRPr lang="da-DK" dirty="0" smtClean="0"/>
-          </a:p>
-          <a:p>
-            <a:r>
-              <a:rPr lang="da-DK" dirty="0" smtClean="0"/>
-              <a:t>Ældre og specielt demente kan have svært ved </a:t>
-            </a:r>
-            <a:r>
-              <a:rPr lang="da-DK" dirty="0" smtClean="0"/>
-              <a:t>at huske at genoplade batterierne.</a:t>
+          </a:p>
+          <a:p>
+            <a:r>
+              <a:rPr lang="da-DK" dirty="0" smtClean="0"/>
+              <a:t>Ældre og specielt demente kan have svært ved at huske at genoplade batterierne.</a:t>
             </a:r>
           </a:p>
           <a:p>
@@ -3578,7 +3740,6 @@
               <a:rPr lang="da-DK" dirty="0" smtClean="0"/>
               <a:t>Det skal være meget enkelt at oplade ”knappen”</a:t>
             </a:r>
-            <a:endParaRPr lang="da-DK" dirty="0" smtClean="0"/>
           </a:p>
           <a:p>
             <a:r>
@@ -3628,7 +3789,11 @@
           <a:bodyPr/>
           <a:lstStyle/>
           <a:p>
-            <a:endParaRPr lang="da-DK"/>
+            <a:r>
+              <a:rPr lang="da-DK" dirty="0" smtClean="0"/>
+              <a:t>Projektets mål</a:t>
+            </a:r>
+            <a:endParaRPr lang="da-DK" dirty="0"/>
           </a:p>
         </p:txBody>
       </p:sp>
@@ -3647,7 +3812,377 @@
           <a:bodyPr/>
           <a:lstStyle/>
           <a:p>
-            <a:endParaRPr lang="da-DK"/>
+            <a:r>
+              <a:rPr lang="da-DK" dirty="0" err="1" smtClean="0"/>
+              <a:t>Proof-of-concept</a:t>
+            </a:r>
+            <a:endParaRPr lang="da-DK" dirty="0" smtClean="0"/>
+          </a:p>
+          <a:p>
+            <a:r>
+              <a:rPr lang="da-DK" dirty="0" smtClean="0"/>
+              <a:t>Arkitektur design (</a:t>
+            </a:r>
+            <a:r>
+              <a:rPr lang="da-DK" dirty="0" err="1" smtClean="0"/>
+              <a:t>reccomended</a:t>
+            </a:r>
+            <a:r>
+              <a:rPr lang="da-DK" dirty="0" smtClean="0"/>
+              <a:t> </a:t>
+            </a:r>
+            <a:r>
+              <a:rPr lang="da-DK" dirty="0" err="1" smtClean="0"/>
+              <a:t>mapping</a:t>
+            </a:r>
+            <a:r>
+              <a:rPr lang="da-DK" dirty="0" smtClean="0"/>
+              <a:t>)</a:t>
+            </a:r>
+          </a:p>
+          <a:p>
+            <a:r>
+              <a:rPr lang="da-DK" dirty="0" err="1" smtClean="0"/>
+              <a:t>Battery</a:t>
+            </a:r>
+            <a:r>
+              <a:rPr lang="da-DK" dirty="0" smtClean="0"/>
+              <a:t> </a:t>
+            </a:r>
+            <a:r>
+              <a:rPr lang="da-DK" dirty="0" err="1" smtClean="0"/>
+              <a:t>life</a:t>
+            </a:r>
+            <a:r>
+              <a:rPr lang="da-DK" dirty="0" smtClean="0"/>
+              <a:t> </a:t>
+            </a:r>
+            <a:r>
+              <a:rPr lang="da-DK" dirty="0" err="1" smtClean="0"/>
+              <a:t>evaluation</a:t>
+            </a:r>
+            <a:r>
+              <a:rPr lang="da-DK" dirty="0" smtClean="0"/>
+              <a:t>.</a:t>
+            </a:r>
+          </a:p>
+          <a:p>
+            <a:endParaRPr lang="da-DK" dirty="0"/>
+          </a:p>
+        </p:txBody>
+      </p:sp>
+    </p:spTree>
+  </p:cSld>
+  <p:clrMapOvr>
+    <a:masterClrMapping/>
+  </p:clrMapOvr>
+</p:sld>
+</file>
+
+<file path=ppt/slides/slide8.xml><?xml version="1.0" encoding="utf-8"?>
+<p:sld xmlns:a="http://schemas.openxmlformats.org/drawingml/2006/main" xmlns:r="http://schemas.openxmlformats.org/officeDocument/2006/relationships" xmlns:p="http://schemas.openxmlformats.org/presentationml/2006/main">
+  <p:cSld>
+    <p:spTree>
+      <p:nvGrpSpPr>
+        <p:cNvPr id="1" name=""/>
+        <p:cNvGrpSpPr/>
+        <p:nvPr/>
+      </p:nvGrpSpPr>
+      <p:grpSpPr>
+        <a:xfrm>
+          <a:off x="0" y="0"/>
+          <a:ext cx="0" cy="0"/>
+          <a:chOff x="0" y="0"/>
+          <a:chExt cx="0" cy="0"/>
+        </a:xfrm>
+      </p:grpSpPr>
+      <p:sp>
+        <p:nvSpPr>
+          <p:cNvPr id="2" name="Titel 1"/>
+          <p:cNvSpPr>
+            <a:spLocks noGrp="1"/>
+          </p:cNvSpPr>
+          <p:nvPr>
+            <p:ph type="title"/>
+          </p:nvPr>
+        </p:nvSpPr>
+        <p:spPr/>
+        <p:txBody>
+          <a:bodyPr/>
+          <a:lstStyle/>
+          <a:p>
+            <a:r>
+              <a:rPr lang="da-DK" dirty="0" smtClean="0"/>
+              <a:t>Hvordan når vi vores mål?</a:t>
+            </a:r>
+            <a:endParaRPr lang="da-DK" dirty="0"/>
+          </a:p>
+        </p:txBody>
+      </p:sp>
+      <p:sp>
+        <p:nvSpPr>
+          <p:cNvPr id="3" name="Pladsholder til indhold 2"/>
+          <p:cNvSpPr>
+            <a:spLocks noGrp="1"/>
+          </p:cNvSpPr>
+          <p:nvPr>
+            <p:ph idx="1"/>
+          </p:nvPr>
+        </p:nvSpPr>
+        <p:spPr/>
+        <p:txBody>
+          <a:bodyPr/>
+          <a:lstStyle/>
+          <a:p>
+            <a:pPr marL="514350" indent="-514350">
+              <a:buFont typeface="+mj-lt"/>
+              <a:buAutoNum type="arabicPeriod"/>
+            </a:pPr>
+            <a:r>
+              <a:rPr lang="da-DK" dirty="0" smtClean="0"/>
+              <a:t>Projektoplæg.</a:t>
+            </a:r>
+          </a:p>
+          <a:p>
+            <a:pPr marL="514350" indent="-514350">
+              <a:buFont typeface="+mj-lt"/>
+              <a:buAutoNum type="arabicPeriod"/>
+            </a:pPr>
+            <a:r>
+              <a:rPr lang="da-DK" dirty="0" err="1" smtClean="0"/>
+              <a:t>Use</a:t>
+            </a:r>
+            <a:r>
+              <a:rPr lang="da-DK" dirty="0" smtClean="0"/>
+              <a:t> case krav og </a:t>
+            </a:r>
+            <a:r>
+              <a:rPr lang="da-DK" dirty="0" err="1" smtClean="0"/>
+              <a:t>non-funktionel</a:t>
+            </a:r>
+            <a:r>
+              <a:rPr lang="da-DK" dirty="0" smtClean="0"/>
+              <a:t> tabel.</a:t>
+            </a:r>
+          </a:p>
+          <a:p>
+            <a:pPr marL="514350" indent="-514350">
+              <a:buFont typeface="+mj-lt"/>
+              <a:buAutoNum type="arabicPeriod"/>
+            </a:pPr>
+            <a:r>
+              <a:rPr lang="da-DK" dirty="0" err="1" smtClean="0"/>
+              <a:t>SysML</a:t>
+            </a:r>
+            <a:r>
+              <a:rPr lang="da-DK" dirty="0" smtClean="0"/>
+              <a:t> til arkitektur design.</a:t>
+            </a:r>
+          </a:p>
+          <a:p>
+            <a:pPr marL="514350" indent="-514350">
+              <a:buFont typeface="+mj-lt"/>
+              <a:buAutoNum type="arabicPeriod"/>
+            </a:pPr>
+            <a:r>
+              <a:rPr lang="da-DK" dirty="0" smtClean="0"/>
+              <a:t>Alternative </a:t>
+            </a:r>
+            <a:r>
+              <a:rPr lang="da-DK" dirty="0" err="1" smtClean="0"/>
+              <a:t>mapninger</a:t>
+            </a:r>
+            <a:r>
+              <a:rPr lang="da-DK" dirty="0" smtClean="0"/>
+              <a:t> af </a:t>
+            </a:r>
+            <a:r>
+              <a:rPr lang="da-DK" dirty="0" err="1" smtClean="0"/>
+              <a:t>arkitekture</a:t>
+            </a:r>
+            <a:r>
+              <a:rPr lang="da-DK" dirty="0" smtClean="0"/>
+              <a:t> (</a:t>
+            </a:r>
+            <a:r>
+              <a:rPr lang="da-DK" dirty="0" err="1" smtClean="0"/>
+              <a:t>method</a:t>
+            </a:r>
+            <a:r>
+              <a:rPr lang="da-DK" dirty="0" smtClean="0"/>
+              <a:t> ???)</a:t>
+            </a:r>
+          </a:p>
+          <a:p>
+            <a:pPr marL="514350" indent="-514350">
+              <a:buFont typeface="+mj-lt"/>
+              <a:buAutoNum type="arabicPeriod"/>
+            </a:pPr>
+            <a:r>
+              <a:rPr lang="da-DK" dirty="0" err="1" smtClean="0"/>
+              <a:t>SystemC</a:t>
+            </a:r>
+            <a:r>
+              <a:rPr lang="da-DK" dirty="0" smtClean="0"/>
+              <a:t> til simulering og evaluering af alternative </a:t>
+            </a:r>
+            <a:r>
+              <a:rPr lang="da-DK" dirty="0" err="1" smtClean="0"/>
+              <a:t>arkitekture</a:t>
+            </a:r>
+            <a:r>
+              <a:rPr lang="da-DK" dirty="0" smtClean="0"/>
+              <a:t>.</a:t>
+            </a:r>
+          </a:p>
+          <a:p>
+            <a:pPr marL="514350" indent="-514350">
+              <a:buFont typeface="+mj-lt"/>
+              <a:buAutoNum type="arabicPeriod"/>
+            </a:pPr>
+            <a:r>
+              <a:rPr lang="da-DK" dirty="0" smtClean="0"/>
+              <a:t>Konklusion</a:t>
+            </a:r>
+          </a:p>
+          <a:p>
+            <a:pPr marL="514350" indent="-514350">
+              <a:buFont typeface="+mj-lt"/>
+              <a:buAutoNum type="arabicPeriod"/>
+            </a:pPr>
+            <a:endParaRPr lang="da-DK" dirty="0"/>
+          </a:p>
+        </p:txBody>
+      </p:sp>
+    </p:spTree>
+  </p:cSld>
+  <p:clrMapOvr>
+    <a:masterClrMapping/>
+  </p:clrMapOvr>
+</p:sld>
+</file>
+
+<file path=ppt/slides/slide9.xml><?xml version="1.0" encoding="utf-8"?>
+<p:sld xmlns:a="http://schemas.openxmlformats.org/drawingml/2006/main" xmlns:r="http://schemas.openxmlformats.org/officeDocument/2006/relationships" xmlns:p="http://schemas.openxmlformats.org/presentationml/2006/main">
+  <p:cSld>
+    <p:spTree>
+      <p:nvGrpSpPr>
+        <p:cNvPr id="1" name=""/>
+        <p:cNvGrpSpPr/>
+        <p:nvPr/>
+      </p:nvGrpSpPr>
+      <p:grpSpPr>
+        <a:xfrm>
+          <a:off x="0" y="0"/>
+          <a:ext cx="0" cy="0"/>
+          <a:chOff x="0" y="0"/>
+          <a:chExt cx="0" cy="0"/>
+        </a:xfrm>
+      </p:grpSpPr>
+      <p:sp>
+        <p:nvSpPr>
+          <p:cNvPr id="2" name="Titel 1"/>
+          <p:cNvSpPr>
+            <a:spLocks noGrp="1"/>
+          </p:cNvSpPr>
+          <p:nvPr>
+            <p:ph type="title"/>
+          </p:nvPr>
+        </p:nvSpPr>
+        <p:spPr/>
+        <p:txBody>
+          <a:bodyPr/>
+          <a:lstStyle/>
+          <a:p>
+            <a:r>
+              <a:rPr lang="da-DK" dirty="0" smtClean="0"/>
+              <a:t>Aflevering</a:t>
+            </a:r>
+            <a:endParaRPr lang="da-DK" dirty="0"/>
+          </a:p>
+        </p:txBody>
+      </p:sp>
+      <p:sp>
+        <p:nvSpPr>
+          <p:cNvPr id="3" name="Pladsholder til indhold 2"/>
+          <p:cNvSpPr>
+            <a:spLocks noGrp="1"/>
+          </p:cNvSpPr>
+          <p:nvPr>
+            <p:ph idx="1"/>
+          </p:nvPr>
+        </p:nvSpPr>
+        <p:spPr/>
+        <p:txBody>
+          <a:bodyPr/>
+          <a:lstStyle/>
+          <a:p>
+            <a:r>
+              <a:rPr lang="da-DK" dirty="0" smtClean="0"/>
+              <a:t>Arkitektur design som </a:t>
+            </a:r>
+            <a:r>
+              <a:rPr lang="da-DK" dirty="0" err="1" smtClean="0"/>
+              <a:t>SysML</a:t>
+            </a:r>
+            <a:r>
+              <a:rPr lang="da-DK" dirty="0" smtClean="0"/>
+              <a:t> diagrammer.</a:t>
+            </a:r>
+          </a:p>
+          <a:p>
+            <a:r>
+              <a:rPr lang="da-DK" dirty="0" smtClean="0"/>
+              <a:t>Evaluering af arkitektur </a:t>
+            </a:r>
+            <a:r>
+              <a:rPr lang="da-DK" dirty="0" err="1" smtClean="0"/>
+              <a:t>mapninger</a:t>
+            </a:r>
+            <a:r>
+              <a:rPr lang="da-DK" dirty="0" smtClean="0"/>
+              <a:t> med </a:t>
+            </a:r>
+            <a:r>
+              <a:rPr lang="da-DK" dirty="0" err="1" smtClean="0"/>
+              <a:t>SystemC</a:t>
+            </a:r>
+            <a:endParaRPr lang="da-DK" dirty="0" smtClean="0"/>
+          </a:p>
+          <a:p>
+            <a:r>
+              <a:rPr lang="da-DK" dirty="0" smtClean="0"/>
+              <a:t>Anbefalet </a:t>
+            </a:r>
+            <a:r>
+              <a:rPr lang="da-DK" dirty="0" err="1" smtClean="0"/>
+              <a:t>mapning</a:t>
+            </a:r>
+            <a:r>
+              <a:rPr lang="da-DK" dirty="0" smtClean="0"/>
+              <a:t> med rationale</a:t>
+            </a:r>
+          </a:p>
+          <a:p>
+            <a:r>
+              <a:rPr lang="da-DK" dirty="0" smtClean="0"/>
+              <a:t>Evaluering af </a:t>
+            </a:r>
+            <a:r>
+              <a:rPr lang="da-DK" dirty="0" err="1" smtClean="0"/>
+              <a:t>process</a:t>
+            </a:r>
+            <a:r>
+              <a:rPr lang="da-DK" dirty="0" smtClean="0"/>
+              <a:t> og metoder</a:t>
+            </a:r>
+          </a:p>
+          <a:p>
+            <a:r>
+              <a:rPr lang="da-DK" dirty="0" smtClean="0"/>
+              <a:t>Konklusion</a:t>
+            </a:r>
+            <a:endParaRPr lang="da-DK" dirty="0"/>
           </a:p>
         </p:txBody>
       </p:sp>

</xml_diff>

<commit_message>
JVH Added formål, læreprocess
</commit_message>
<xml_diff>
--- a/syseng_hwco/proj/Artifact/Presentations/Presentation_11_02_11.pptx
+++ b/syseng_hwco/proj/Artifact/Presentations/Presentation_11_02_11.pptx
@@ -397,7 +397,7 @@
               <a:pPr>
                 <a:defRPr/>
               </a:pPr>
-              <a:t>‹#›</a:t>
+              <a:t>‹nr.›</a:t>
             </a:fld>
             <a:endParaRPr lang="da-DK"/>
           </a:p>
@@ -589,7 +589,7 @@
               <a:pPr>
                 <a:defRPr/>
               </a:pPr>
-              <a:t>‹#›</a:t>
+              <a:t>‹nr.›</a:t>
             </a:fld>
             <a:endParaRPr lang="da-DK"/>
           </a:p>
@@ -791,7 +791,7 @@
               <a:pPr>
                 <a:defRPr/>
               </a:pPr>
-              <a:t>‹#›</a:t>
+              <a:t>‹nr.›</a:t>
             </a:fld>
             <a:endParaRPr lang="da-DK"/>
           </a:p>
@@ -983,7 +983,7 @@
               <a:pPr>
                 <a:defRPr/>
               </a:pPr>
-              <a:t>‹#›</a:t>
+              <a:t>‹nr.›</a:t>
             </a:fld>
             <a:endParaRPr lang="da-DK"/>
           </a:p>
@@ -1251,7 +1251,7 @@
               <a:pPr>
                 <a:defRPr/>
               </a:pPr>
-              <a:t>‹#›</a:t>
+              <a:t>‹nr.›</a:t>
             </a:fld>
             <a:endParaRPr lang="da-DK"/>
           </a:p>
@@ -1561,7 +1561,7 @@
               <a:pPr>
                 <a:defRPr/>
               </a:pPr>
-              <a:t>‹#›</a:t>
+              <a:t>‹nr.›</a:t>
             </a:fld>
             <a:endParaRPr lang="da-DK"/>
           </a:p>
@@ -2005,7 +2005,7 @@
               <a:pPr>
                 <a:defRPr/>
               </a:pPr>
-              <a:t>‹#›</a:t>
+              <a:t>‹nr.›</a:t>
             </a:fld>
             <a:endParaRPr lang="da-DK"/>
           </a:p>
@@ -2145,7 +2145,7 @@
               <a:pPr>
                 <a:defRPr/>
               </a:pPr>
-              <a:t>‹#›</a:t>
+              <a:t>‹nr.›</a:t>
             </a:fld>
             <a:endParaRPr lang="da-DK"/>
           </a:p>
@@ -2262,7 +2262,7 @@
               <a:pPr>
                 <a:defRPr/>
               </a:pPr>
-              <a:t>‹#›</a:t>
+              <a:t>‹nr.›</a:t>
             </a:fld>
             <a:endParaRPr lang="da-DK"/>
           </a:p>
@@ -2561,7 +2561,7 @@
               <a:pPr>
                 <a:defRPr/>
               </a:pPr>
-              <a:t>‹#›</a:t>
+              <a:t>‹nr.›</a:t>
             </a:fld>
             <a:endParaRPr lang="da-DK"/>
           </a:p>
@@ -2839,7 +2839,7 @@
               <a:pPr>
                 <a:defRPr/>
               </a:pPr>
-              <a:t>‹#›</a:t>
+              <a:t>‹nr.›</a:t>
             </a:fld>
             <a:endParaRPr lang="da-DK"/>
           </a:p>
@@ -3136,7 +3136,7 @@
               <a:pPr>
                 <a:defRPr/>
               </a:pPr>
-              <a:t>‹#›</a:t>
+              <a:t>‹nr.›</a:t>
             </a:fld>
             <a:endParaRPr lang="da-DK"/>
           </a:p>
@@ -3674,12 +3674,92 @@
           <a:lstStyle/>
           <a:p>
             <a:r>
-              <a:rPr lang="da-DK" smtClean="0"/>
-              <a:t>Synthesis SysML/UML til SystemC simulation</a:t>
-            </a:r>
-          </a:p>
-          <a:p>
-            <a:endParaRPr lang="da-DK" smtClean="0"/>
+              <a:rPr lang="da-DK" dirty="0" smtClean="0"/>
+              <a:t>Forundersøgelse (SRS, </a:t>
+            </a:r>
+            <a:r>
+              <a:rPr lang="da-DK" i="1" dirty="0" smtClean="0"/>
+              <a:t>DDD</a:t>
+            </a:r>
+            <a:r>
+              <a:rPr lang="da-DK" dirty="0" smtClean="0"/>
+              <a:t>)</a:t>
+            </a:r>
+          </a:p>
+          <a:p>
+            <a:r>
+              <a:rPr lang="da-DK" dirty="0" err="1" smtClean="0"/>
+              <a:t>Risk</a:t>
+            </a:r>
+            <a:r>
+              <a:rPr lang="da-DK" dirty="0" smtClean="0"/>
+              <a:t> </a:t>
+            </a:r>
+            <a:r>
+              <a:rPr lang="da-DK" dirty="0" err="1" smtClean="0"/>
+              <a:t>level</a:t>
+            </a:r>
+            <a:r>
+              <a:rPr lang="da-DK" dirty="0" smtClean="0"/>
+              <a:t> </a:t>
+            </a:r>
+            <a:r>
+              <a:rPr lang="da-DK" dirty="0" smtClean="0"/>
+              <a:t>management</a:t>
+            </a:r>
+            <a:endParaRPr lang="da-DK" dirty="0" smtClean="0"/>
+          </a:p>
+          <a:p>
+            <a:r>
+              <a:rPr lang="da-DK" dirty="0" err="1" smtClean="0"/>
+              <a:t>Synthesis</a:t>
+            </a:r>
+            <a:r>
+              <a:rPr lang="da-DK" dirty="0" smtClean="0"/>
+              <a:t> </a:t>
+            </a:r>
+            <a:r>
+              <a:rPr lang="da-DK" dirty="0" err="1" smtClean="0"/>
+              <a:t>SysML/UML</a:t>
+            </a:r>
+            <a:r>
+              <a:rPr lang="da-DK" dirty="0" smtClean="0"/>
+              <a:t> til </a:t>
+            </a:r>
+            <a:r>
+              <a:rPr lang="da-DK" dirty="0" err="1" smtClean="0"/>
+              <a:t>SystemC</a:t>
+            </a:r>
+            <a:r>
+              <a:rPr lang="da-DK" dirty="0" smtClean="0"/>
+              <a:t> </a:t>
+            </a:r>
+            <a:r>
+              <a:rPr lang="da-DK" dirty="0" smtClean="0"/>
+              <a:t>simulation</a:t>
+            </a:r>
+          </a:p>
+          <a:p>
+            <a:r>
+              <a:rPr lang="da-DK" dirty="0" smtClean="0"/>
+              <a:t>Mest optimal </a:t>
+            </a:r>
+            <a:r>
+              <a:rPr lang="da-DK" dirty="0" err="1" smtClean="0"/>
+              <a:t>mapning</a:t>
+            </a:r>
+            <a:r>
+              <a:rPr lang="da-DK" dirty="0" smtClean="0"/>
+              <a:t> i forhold til </a:t>
+            </a:r>
+            <a:r>
+              <a:rPr lang="da-DK" dirty="0" err="1" smtClean="0"/>
+              <a:t>metric</a:t>
+            </a:r>
+            <a:endParaRPr lang="da-DK" dirty="0" smtClean="0"/>
+          </a:p>
+          <a:p>
+            <a:endParaRPr lang="da-DK" dirty="0" smtClean="0"/>
           </a:p>
         </p:txBody>
       </p:sp>
@@ -3817,7 +3897,7 @@
           <p:nvPr/>
         </p:nvPicPr>
         <p:blipFill>
-          <a:blip r:embed="rId2"/>
+          <a:blip r:embed="rId2" cstate="print"/>
           <a:srcRect/>
           <a:stretch>
             <a:fillRect/>
@@ -4053,7 +4133,7 @@
           <p:nvPr/>
         </p:nvPicPr>
         <p:blipFill>
-          <a:blip r:embed="rId2"/>
+          <a:blip r:embed="rId2" cstate="print"/>
           <a:srcRect t="20415"/>
           <a:stretch>
             <a:fillRect/>
@@ -4287,24 +4367,191 @@
           <a:lstStyle/>
           <a:p>
             <a:r>
-              <a:rPr lang="da-DK" smtClean="0"/>
+              <a:rPr lang="da-DK" dirty="0" smtClean="0"/>
+              <a:t>System arkitektur beskrevet i </a:t>
+            </a:r>
+            <a:r>
+              <a:rPr lang="da-DK" dirty="0" err="1" smtClean="0"/>
+              <a:t>SysML</a:t>
+            </a:r>
+            <a:endParaRPr lang="da-DK" dirty="0" smtClean="0"/>
+          </a:p>
+          <a:p>
+            <a:pPr lvl="1"/>
+            <a:r>
+              <a:rPr lang="da-DK" dirty="0" smtClean="0"/>
+              <a:t>Simulering i </a:t>
+            </a:r>
+            <a:r>
+              <a:rPr lang="da-DK" dirty="0" err="1" smtClean="0"/>
+              <a:t>SystemC</a:t>
+            </a:r>
+            <a:endParaRPr lang="da-DK" dirty="0" smtClean="0"/>
+          </a:p>
+          <a:p>
+            <a:pPr lvl="1"/>
+            <a:r>
+              <a:rPr lang="da-DK" dirty="0" err="1" smtClean="0"/>
+              <a:t>Mapning</a:t>
+            </a:r>
+            <a:r>
+              <a:rPr lang="da-DK" dirty="0" smtClean="0"/>
+              <a:t> af arkitektur </a:t>
+            </a:r>
+            <a:r>
+              <a:rPr lang="da-DK" dirty="0" err="1" smtClean="0"/>
+              <a:t>udfra</a:t>
+            </a:r>
+            <a:r>
+              <a:rPr lang="da-DK" dirty="0" smtClean="0"/>
+              <a:t> simulering (</a:t>
+            </a:r>
+            <a:r>
+              <a:rPr lang="da-DK" dirty="0" err="1" smtClean="0"/>
+              <a:t>pireto/design</a:t>
+            </a:r>
+            <a:r>
+              <a:rPr lang="da-DK" dirty="0" smtClean="0"/>
+              <a:t> </a:t>
+            </a:r>
+            <a:r>
+              <a:rPr lang="da-DK" dirty="0" err="1" smtClean="0"/>
+              <a:t>space</a:t>
+            </a:r>
+            <a:r>
+              <a:rPr lang="da-DK" dirty="0" smtClean="0"/>
+              <a:t> </a:t>
+            </a:r>
+            <a:r>
+              <a:rPr lang="da-DK" dirty="0" err="1" smtClean="0"/>
+              <a:t>exploration/profilling</a:t>
+            </a:r>
+            <a:r>
+              <a:rPr lang="da-DK" dirty="0" smtClean="0"/>
+              <a:t>) </a:t>
+            </a:r>
+          </a:p>
+          <a:p>
+            <a:pPr lvl="1"/>
+            <a:r>
+              <a:rPr lang="da-DK" dirty="0" err="1" smtClean="0"/>
+              <a:t>Mapning</a:t>
+            </a:r>
+            <a:r>
+              <a:rPr lang="da-DK" dirty="0" smtClean="0"/>
+              <a:t> i forhold til </a:t>
+            </a:r>
+            <a:r>
+              <a:rPr lang="da-DK" dirty="0" err="1" smtClean="0"/>
+              <a:t>Metrics</a:t>
+            </a:r>
+            <a:r>
+              <a:rPr lang="da-DK" dirty="0" smtClean="0"/>
+              <a:t> (</a:t>
+            </a:r>
+            <a:r>
+              <a:rPr lang="da-DK" dirty="0" err="1" smtClean="0"/>
+              <a:t>quality</a:t>
+            </a:r>
+            <a:r>
+              <a:rPr lang="da-DK" dirty="0" smtClean="0"/>
+              <a:t> </a:t>
+            </a:r>
+            <a:r>
+              <a:rPr lang="da-DK" dirty="0" err="1" smtClean="0"/>
+              <a:t>attributes</a:t>
+            </a:r>
+            <a:r>
+              <a:rPr lang="da-DK" dirty="0" smtClean="0"/>
+              <a:t>)</a:t>
+            </a:r>
+          </a:p>
+          <a:p>
+            <a:r>
+              <a:rPr lang="da-DK" dirty="0" err="1" smtClean="0">
+                <a:solidFill>
+                  <a:srgbClr val="FFFF00"/>
+                </a:solidFill>
+              </a:rPr>
               <a:t>Proof-of-concept</a:t>
             </a:r>
-          </a:p>
-          <a:p>
-            <a:r>
-              <a:rPr lang="da-DK" smtClean="0"/>
-              <a:t>Arkitektur design (reccomended mapping)</a:t>
-            </a:r>
-          </a:p>
-          <a:p>
-            <a:r>
-              <a:rPr lang="da-DK" smtClean="0"/>
-              <a:t>Battery life evaluation.</a:t>
-            </a:r>
-          </a:p>
-          <a:p>
-            <a:endParaRPr lang="da-DK" smtClean="0"/>
+            <a:r>
+              <a:rPr lang="da-DK" dirty="0" smtClean="0"/>
+              <a:t> ligger det ikke i overstående</a:t>
+            </a:r>
+          </a:p>
+          <a:p>
+            <a:r>
+              <a:rPr lang="da-DK" dirty="0" err="1" smtClean="0"/>
+              <a:t>Risk</a:t>
+            </a:r>
+            <a:r>
+              <a:rPr lang="da-DK" dirty="0" smtClean="0"/>
+              <a:t> </a:t>
+            </a:r>
+            <a:r>
+              <a:rPr lang="da-DK" dirty="0" err="1" smtClean="0"/>
+              <a:t>level</a:t>
+            </a:r>
+            <a:r>
+              <a:rPr lang="da-DK" dirty="0" smtClean="0"/>
+              <a:t> management (</a:t>
+            </a:r>
+            <a:r>
+              <a:rPr lang="da-DK" dirty="0" err="1" smtClean="0"/>
+              <a:t>Can</a:t>
+            </a:r>
+            <a:r>
+              <a:rPr lang="da-DK" dirty="0" smtClean="0"/>
+              <a:t> </a:t>
+            </a:r>
+            <a:r>
+              <a:rPr lang="da-DK" dirty="0" err="1" smtClean="0"/>
+              <a:t>we</a:t>
+            </a:r>
+            <a:r>
+              <a:rPr lang="da-DK" dirty="0" smtClean="0"/>
+              <a:t> deliver, Time to </a:t>
+            </a:r>
+            <a:r>
+              <a:rPr lang="da-DK" dirty="0" err="1" smtClean="0"/>
+              <a:t>market</a:t>
+            </a:r>
+            <a:r>
+              <a:rPr lang="da-DK" dirty="0" smtClean="0"/>
+              <a:t>)</a:t>
+            </a:r>
+            <a:endParaRPr lang="da-DK" dirty="0" smtClean="0"/>
+          </a:p>
+          <a:p>
+            <a:r>
+              <a:rPr lang="da-DK" dirty="0" err="1" smtClean="0"/>
+              <a:t>Battery</a:t>
+            </a:r>
+            <a:r>
+              <a:rPr lang="da-DK" dirty="0" smtClean="0"/>
+              <a:t> </a:t>
+            </a:r>
+            <a:r>
+              <a:rPr lang="da-DK" dirty="0" err="1" smtClean="0"/>
+              <a:t>life</a:t>
+            </a:r>
+            <a:r>
+              <a:rPr lang="da-DK" dirty="0" smtClean="0"/>
+              <a:t> </a:t>
+            </a:r>
+            <a:r>
+              <a:rPr lang="da-DK" dirty="0" err="1" smtClean="0"/>
+              <a:t>evaluation</a:t>
+            </a:r>
+            <a:r>
+              <a:rPr lang="da-DK" dirty="0" smtClean="0"/>
+              <a:t>.</a:t>
+            </a:r>
+            <a:endParaRPr lang="da-DK" dirty="0" smtClean="0"/>
+          </a:p>
+          <a:p>
+            <a:endParaRPr lang="da-DK" dirty="0" smtClean="0"/>
           </a:p>
         </p:txBody>
       </p:sp>
@@ -4375,7 +4622,7 @@
               <a:buAutoNum type="arabicPeriod"/>
             </a:pPr>
             <a:r>
-              <a:rPr lang="da-DK" smtClean="0"/>
+              <a:rPr lang="da-DK" dirty="0" smtClean="0"/>
               <a:t>Projektoplæg.</a:t>
             </a:r>
           </a:p>
@@ -4385,8 +4632,20 @@
               <a:buAutoNum type="arabicPeriod"/>
             </a:pPr>
             <a:r>
-              <a:rPr lang="da-DK" smtClean="0"/>
-              <a:t>Use case krav og non-funktionel tabel.</a:t>
+              <a:rPr lang="da-DK" dirty="0" err="1" smtClean="0"/>
+              <a:t>Use</a:t>
+            </a:r>
+            <a:r>
+              <a:rPr lang="da-DK" dirty="0" smtClean="0"/>
+              <a:t> case krav og </a:t>
+            </a:r>
+            <a:r>
+              <a:rPr lang="da-DK" dirty="0" err="1" smtClean="0"/>
+              <a:t>non-funktionel</a:t>
+            </a:r>
+            <a:r>
+              <a:rPr lang="da-DK" dirty="0" smtClean="0"/>
+              <a:t> tabel.</a:t>
             </a:r>
           </a:p>
           <a:p>
@@ -4395,8 +4654,12 @@
               <a:buAutoNum type="arabicPeriod"/>
             </a:pPr>
             <a:r>
-              <a:rPr lang="da-DK" smtClean="0"/>
-              <a:t>SysML til arkitektur design.</a:t>
+              <a:rPr lang="da-DK" dirty="0" err="1" smtClean="0"/>
+              <a:t>SysML</a:t>
+            </a:r>
+            <a:r>
+              <a:rPr lang="da-DK" dirty="0" smtClean="0"/>
+              <a:t> til arkitektur design.</a:t>
             </a:r>
           </a:p>
           <a:p>
@@ -4405,9 +4668,54 @@
               <a:buAutoNum type="arabicPeriod"/>
             </a:pPr>
             <a:r>
-              <a:rPr lang="da-DK" smtClean="0"/>
-              <a:t>Alternative mapninger af arkitekture (Pereto points and ???)</a:t>
-            </a:r>
+              <a:rPr lang="da-DK" dirty="0" smtClean="0"/>
+              <a:t>Alternative </a:t>
+            </a:r>
+            <a:r>
+              <a:rPr lang="da-DK" dirty="0" err="1" smtClean="0"/>
+              <a:t>mapninger</a:t>
+            </a:r>
+            <a:r>
+              <a:rPr lang="da-DK" dirty="0" smtClean="0"/>
+              <a:t> af </a:t>
+            </a:r>
+            <a:r>
+              <a:rPr lang="da-DK" dirty="0" err="1" smtClean="0"/>
+              <a:t>arkitekture</a:t>
+            </a:r>
+            <a:r>
+              <a:rPr lang="da-DK" dirty="0" smtClean="0"/>
+              <a:t> (</a:t>
+            </a:r>
+            <a:r>
+              <a:rPr lang="da-DK" dirty="0" err="1" smtClean="0"/>
+              <a:t>Pereto</a:t>
+            </a:r>
+            <a:r>
+              <a:rPr lang="da-DK" dirty="0" smtClean="0"/>
+              <a:t> points and </a:t>
+            </a:r>
+            <a:r>
+              <a:rPr lang="da-DK" dirty="0" smtClean="0"/>
+              <a:t>design </a:t>
+            </a:r>
+            <a:r>
+              <a:rPr lang="da-DK" dirty="0" err="1" smtClean="0"/>
+              <a:t>space</a:t>
+            </a:r>
+            <a:r>
+              <a:rPr lang="da-DK" dirty="0" smtClean="0"/>
+              <a:t> </a:t>
+            </a:r>
+            <a:r>
+              <a:rPr lang="da-DK" dirty="0" err="1" smtClean="0"/>
+              <a:t>exploration</a:t>
+            </a:r>
+            <a:r>
+              <a:rPr lang="da-DK" dirty="0" smtClean="0"/>
+              <a:t>)</a:t>
+            </a:r>
+            <a:endParaRPr lang="da-DK" dirty="0" smtClean="0"/>
           </a:p>
           <a:p>
             <a:pPr marL="514350" indent="-514350">
@@ -4415,8 +4723,20 @@
               <a:buAutoNum type="arabicPeriod"/>
             </a:pPr>
             <a:r>
-              <a:rPr lang="da-DK" smtClean="0"/>
-              <a:t>SystemC til simulering og evaluering af alternative arkitekturer.</a:t>
+              <a:rPr lang="da-DK" dirty="0" err="1" smtClean="0"/>
+              <a:t>SystemC</a:t>
+            </a:r>
+            <a:r>
+              <a:rPr lang="da-DK" dirty="0" smtClean="0"/>
+              <a:t> til </a:t>
+            </a:r>
+            <a:r>
+              <a:rPr lang="da-DK" dirty="0" smtClean="0"/>
+              <a:t>simulering </a:t>
+            </a:r>
+            <a:r>
+              <a:rPr lang="da-DK" dirty="0" smtClean="0"/>
+              <a:t>og evaluering af alternative arkitekturer.</a:t>
             </a:r>
           </a:p>
           <a:p>
@@ -4425,7 +4745,7 @@
               <a:buAutoNum type="arabicPeriod"/>
             </a:pPr>
             <a:r>
-              <a:rPr lang="da-DK" smtClean="0"/>
+              <a:rPr lang="da-DK" dirty="0" smtClean="0"/>
               <a:t>Konklusion</a:t>
             </a:r>
           </a:p>
@@ -4434,7 +4754,7 @@
               <a:buFont typeface="Calibri" pitchFamily="34" charset="0"/>
               <a:buAutoNum type="arabicPeriod"/>
             </a:pPr>
-            <a:endParaRPr lang="da-DK" smtClean="0"/>
+            <a:endParaRPr lang="da-DK" dirty="0" smtClean="0"/>
           </a:p>
         </p:txBody>
       </p:sp>

</xml_diff>

<commit_message>
Updating presentation and renaming link
</commit_message>
<xml_diff>
--- a/syseng_hwco/proj/Artifact/Presentations/Presentation_11_02_11.pptx
+++ b/syseng_hwco/proj/Artifact/Presentations/Presentation_11_02_11.pptx
@@ -338,7 +338,7 @@
               <a:pPr>
                 <a:defRPr/>
               </a:pPr>
-              <a:t>09-02-2011</a:t>
+              <a:t>10-02-2011</a:t>
             </a:fld>
             <a:endParaRPr lang="da-DK"/>
           </a:p>
@@ -530,7 +530,7 @@
               <a:pPr>
                 <a:defRPr/>
               </a:pPr>
-              <a:t>09-02-2011</a:t>
+              <a:t>10-02-2011</a:t>
             </a:fld>
             <a:endParaRPr lang="da-DK"/>
           </a:p>
@@ -732,7 +732,7 @@
               <a:pPr>
                 <a:defRPr/>
               </a:pPr>
-              <a:t>09-02-2011</a:t>
+              <a:t>10-02-2011</a:t>
             </a:fld>
             <a:endParaRPr lang="da-DK"/>
           </a:p>
@@ -924,7 +924,7 @@
               <a:pPr>
                 <a:defRPr/>
               </a:pPr>
-              <a:t>09-02-2011</a:t>
+              <a:t>10-02-2011</a:t>
             </a:fld>
             <a:endParaRPr lang="da-DK"/>
           </a:p>
@@ -1192,7 +1192,7 @@
               <a:pPr>
                 <a:defRPr/>
               </a:pPr>
-              <a:t>09-02-2011</a:t>
+              <a:t>10-02-2011</a:t>
             </a:fld>
             <a:endParaRPr lang="da-DK"/>
           </a:p>
@@ -1502,7 +1502,7 @@
               <a:pPr>
                 <a:defRPr/>
               </a:pPr>
-              <a:t>09-02-2011</a:t>
+              <a:t>10-02-2011</a:t>
             </a:fld>
             <a:endParaRPr lang="da-DK"/>
           </a:p>
@@ -1946,7 +1946,7 @@
               <a:pPr>
                 <a:defRPr/>
               </a:pPr>
-              <a:t>09-02-2011</a:t>
+              <a:t>10-02-2011</a:t>
             </a:fld>
             <a:endParaRPr lang="da-DK"/>
           </a:p>
@@ -2086,7 +2086,7 @@
               <a:pPr>
                 <a:defRPr/>
               </a:pPr>
-              <a:t>09-02-2011</a:t>
+              <a:t>10-02-2011</a:t>
             </a:fld>
             <a:endParaRPr lang="da-DK"/>
           </a:p>
@@ -2203,7 +2203,7 @@
               <a:pPr>
                 <a:defRPr/>
               </a:pPr>
-              <a:t>09-02-2011</a:t>
+              <a:t>10-02-2011</a:t>
             </a:fld>
             <a:endParaRPr lang="da-DK"/>
           </a:p>
@@ -2502,7 +2502,7 @@
               <a:pPr>
                 <a:defRPr/>
               </a:pPr>
-              <a:t>09-02-2011</a:t>
+              <a:t>10-02-2011</a:t>
             </a:fld>
             <a:endParaRPr lang="da-DK"/>
           </a:p>
@@ -2780,7 +2780,7 @@
               <a:pPr>
                 <a:defRPr/>
               </a:pPr>
-              <a:t>09-02-2011</a:t>
+              <a:t>10-02-2011</a:t>
             </a:fld>
             <a:endParaRPr lang="da-DK"/>
           </a:p>
@@ -3035,7 +3035,7 @@
               <a:pPr>
                 <a:defRPr/>
               </a:pPr>
-              <a:t>09-02-2011</a:t>
+              <a:t>10-02-2011</a:t>
             </a:fld>
             <a:endParaRPr lang="da-DK"/>
           </a:p>
@@ -3701,13 +3701,8 @@
             </a:r>
             <a:r>
               <a:rPr lang="da-DK" dirty="0" smtClean="0"/>
-              <a:t> </a:t>
-            </a:r>
-            <a:r>
-              <a:rPr lang="da-DK" dirty="0" smtClean="0"/>
-              <a:t>management</a:t>
-            </a:r>
-            <a:endParaRPr lang="da-DK" dirty="0" smtClean="0"/>
+              <a:t> management</a:t>
+            </a:r>
           </a:p>
           <a:p>
             <a:r>
@@ -3732,11 +3727,7 @@
             </a:r>
             <a:r>
               <a:rPr lang="da-DK" dirty="0" smtClean="0"/>
-              <a:t> </a:t>
-            </a:r>
-            <a:r>
-              <a:rPr lang="da-DK" dirty="0" smtClean="0"/>
-              <a:t>simulation</a:t>
+              <a:t> simulation</a:t>
             </a:r>
           </a:p>
           <a:p>
@@ -4374,6 +4365,26 @@
               <a:rPr lang="da-DK" dirty="0" err="1" smtClean="0"/>
               <a:t>SysML</a:t>
             </a:r>
+            <a:r>
+              <a:rPr lang="da-DK" dirty="0" smtClean="0"/>
+              <a:t> (</a:t>
+            </a:r>
+            <a:r>
+              <a:rPr lang="da-DK" dirty="0" err="1" smtClean="0"/>
+              <a:t>Proof</a:t>
+            </a:r>
+            <a:r>
+              <a:rPr lang="da-DK" dirty="0" smtClean="0"/>
+              <a:t> of </a:t>
+            </a:r>
+            <a:r>
+              <a:rPr lang="da-DK" dirty="0" err="1" smtClean="0"/>
+              <a:t>concept</a:t>
+            </a:r>
+            <a:r>
+              <a:rPr lang="da-DK" dirty="0" smtClean="0"/>
+              <a:t>)</a:t>
+            </a:r>
             <a:endParaRPr lang="da-DK" dirty="0" smtClean="0"/>
           </a:p>
           <a:p>
@@ -4468,20 +4479,6 @@
           </a:p>
           <a:p>
             <a:r>
-              <a:rPr lang="da-DK" dirty="0" err="1" smtClean="0">
-                <a:solidFill>
-                  <a:srgbClr val="FFFF00"/>
-                </a:solidFill>
-              </a:rPr>
-              <a:t>Proof-of-concept</a:t>
-            </a:r>
-            <a:r>
-              <a:rPr lang="da-DK" dirty="0" smtClean="0"/>
-              <a:t> ligger det ikke i overstående</a:t>
-            </a:r>
-          </a:p>
-          <a:p>
-            <a:r>
               <a:rPr lang="da-DK" dirty="0" err="1" smtClean="0"/>
               <a:t>Risk</a:t>
             </a:r>
@@ -4521,7 +4518,6 @@
               <a:rPr lang="da-DK" dirty="0" smtClean="0"/>
               <a:t>)</a:t>
             </a:r>
-            <a:endParaRPr lang="da-DK" dirty="0" smtClean="0"/>
           </a:p>
           <a:p>
             <a:r>
@@ -4548,7 +4544,6 @@
               <a:rPr lang="da-DK" dirty="0" smtClean="0"/>
               <a:t>.</a:t>
             </a:r>
-            <a:endParaRPr lang="da-DK" dirty="0" smtClean="0"/>
           </a:p>
           <a:p>
             <a:endParaRPr lang="da-DK" dirty="0" smtClean="0"/>
@@ -4693,11 +4688,7 @@
             </a:r>
             <a:r>
               <a:rPr lang="da-DK" dirty="0" smtClean="0"/>
-              <a:t> points and </a:t>
-            </a:r>
-            <a:r>
-              <a:rPr lang="da-DK" dirty="0" smtClean="0"/>
-              <a:t>design </a:t>
+              <a:t> points and design </a:t>
             </a:r>
             <a:r>
               <a:rPr lang="da-DK" dirty="0" err="1" smtClean="0"/>
@@ -4715,7 +4706,6 @@
               <a:rPr lang="da-DK" dirty="0" smtClean="0"/>
               <a:t>)</a:t>
             </a:r>
-            <a:endParaRPr lang="da-DK" dirty="0" smtClean="0"/>
           </a:p>
           <a:p>
             <a:pPr marL="514350" indent="-514350">
@@ -4728,15 +4718,7 @@
             </a:r>
             <a:r>
               <a:rPr lang="da-DK" dirty="0" smtClean="0"/>
-              <a:t> til </a:t>
-            </a:r>
-            <a:r>
-              <a:rPr lang="da-DK" dirty="0" smtClean="0"/>
-              <a:t>simulering </a:t>
-            </a:r>
-            <a:r>
-              <a:rPr lang="da-DK" dirty="0" smtClean="0"/>
-              <a:t>og evaluering af alternative arkitekturer.</a:t>
+              <a:t> til simulering og evaluering af alternative arkitekturer.</a:t>
             </a:r>
           </a:p>
           <a:p>

</xml_diff>

<commit_message>
BDD og IBD diagrammer tilføjet
</commit_message>
<xml_diff>
--- a/syseng_hwco/proj/Artifact/Presentations/Presentation_11_02_11.pptx
+++ b/syseng_hwco/proj/Artifact/Presentations/Presentation_11_02_11.pptx
@@ -16,6 +16,13 @@
     <p:sldId id="264" r:id="rId10"/>
     <p:sldId id="265" r:id="rId11"/>
     <p:sldId id="266" r:id="rId12"/>
+    <p:sldId id="268" r:id="rId13"/>
+    <p:sldId id="269" r:id="rId14"/>
+    <p:sldId id="267" r:id="rId15"/>
+    <p:sldId id="271" r:id="rId16"/>
+    <p:sldId id="270" r:id="rId17"/>
+    <p:sldId id="273" r:id="rId18"/>
+    <p:sldId id="272" r:id="rId19"/>
   </p:sldIdLst>
   <p:sldSz cx="9144000" cy="6858000" type="screen4x3"/>
   <p:notesSz cx="6858000" cy="9144000"/>
@@ -333,7 +340,7 @@
             <a:pPr>
               <a:defRPr/>
             </a:pPr>
-            <a:fld id="{11EA080B-6E8D-441C-8BF2-827EDBB228D0}" type="datetimeFigureOut">
+            <a:fld id="{E085FBFA-F6C5-4624-A899-24A22AE18124}" type="datetimeFigureOut">
               <a:rPr lang="da-DK"/>
               <a:pPr>
                 <a:defRPr/>
@@ -392,12 +399,12 @@
             <a:pPr>
               <a:defRPr/>
             </a:pPr>
-            <a:fld id="{13E08DC2-AF5B-4AD4-AF7B-5052D613982F}" type="slidenum">
+            <a:fld id="{E181E20A-8375-48E2-9685-7D25B74B2B1B}" type="slidenum">
               <a:rPr lang="da-DK"/>
               <a:pPr>
                 <a:defRPr/>
               </a:pPr>
-              <a:t>‹nr.›</a:t>
+              <a:t>‹#›</a:t>
             </a:fld>
             <a:endParaRPr lang="da-DK"/>
           </a:p>
@@ -525,7 +532,7 @@
             <a:pPr>
               <a:defRPr/>
             </a:pPr>
-            <a:fld id="{8E0CEE42-3084-475F-ADAB-D64885A83AA6}" type="datetimeFigureOut">
+            <a:fld id="{8D6E8C13-FCCD-4D09-85BC-1940E660A1E8}" type="datetimeFigureOut">
               <a:rPr lang="da-DK"/>
               <a:pPr>
                 <a:defRPr/>
@@ -584,12 +591,12 @@
             <a:pPr>
               <a:defRPr/>
             </a:pPr>
-            <a:fld id="{70D36A2B-4E42-4B6D-A787-E05C6F0F09A2}" type="slidenum">
+            <a:fld id="{98A15187-D1D1-4BBA-921E-12E256626425}" type="slidenum">
               <a:rPr lang="da-DK"/>
               <a:pPr>
                 <a:defRPr/>
               </a:pPr>
-              <a:t>‹nr.›</a:t>
+              <a:t>‹#›</a:t>
             </a:fld>
             <a:endParaRPr lang="da-DK"/>
           </a:p>
@@ -727,7 +734,7 @@
             <a:pPr>
               <a:defRPr/>
             </a:pPr>
-            <a:fld id="{D15E59A7-DEE1-4321-90E2-716B67388088}" type="datetimeFigureOut">
+            <a:fld id="{38C3A825-CC70-4EF2-9712-FBDD18EF5AFD}" type="datetimeFigureOut">
               <a:rPr lang="da-DK"/>
               <a:pPr>
                 <a:defRPr/>
@@ -786,12 +793,806 @@
             <a:pPr>
               <a:defRPr/>
             </a:pPr>
-            <a:fld id="{4405ABE2-35C1-46A2-BDFB-8451F15CAFB7}" type="slidenum">
+            <a:fld id="{25F7B943-872E-4C57-B415-EFC652748E98}" type="slidenum">
               <a:rPr lang="da-DK"/>
               <a:pPr>
                 <a:defRPr/>
               </a:pPr>
-              <a:t>‹nr.›</a:t>
+              <a:t>‹#›</a:t>
+            </a:fld>
+            <a:endParaRPr lang="da-DK"/>
+          </a:p>
+        </p:txBody>
+      </p:sp>
+    </p:spTree>
+  </p:cSld>
+  <p:clrMapOvr>
+    <a:masterClrMapping/>
+  </p:clrMapOvr>
+</p:sldLayout>
+</file>
+
+<file path=ppt/slideLayouts/slideLayout12.xml><?xml version="1.0" encoding="utf-8"?>
+<p:sldLayout xmlns:a="http://schemas.openxmlformats.org/drawingml/2006/main" xmlns:r="http://schemas.openxmlformats.org/officeDocument/2006/relationships" xmlns:p="http://schemas.openxmlformats.org/presentationml/2006/main" type="txAndTwoObj" preserve="1">
+  <p:cSld name="Title, Text, and 2 Content">
+    <p:spTree>
+      <p:nvGrpSpPr>
+        <p:cNvPr id="1" name=""/>
+        <p:cNvGrpSpPr/>
+        <p:nvPr/>
+      </p:nvGrpSpPr>
+      <p:grpSpPr>
+        <a:xfrm>
+          <a:off x="0" y="0"/>
+          <a:ext cx="0" cy="0"/>
+          <a:chOff x="0" y="0"/>
+          <a:chExt cx="0" cy="0"/>
+        </a:xfrm>
+      </p:grpSpPr>
+      <p:sp>
+        <p:nvSpPr>
+          <p:cNvPr id="2" name="Title 1"/>
+          <p:cNvSpPr>
+            <a:spLocks noGrp="1"/>
+          </p:cNvSpPr>
+          <p:nvPr>
+            <p:ph type="title"/>
+          </p:nvPr>
+        </p:nvSpPr>
+        <p:spPr>
+          <a:xfrm>
+            <a:off x="457200" y="274638"/>
+            <a:ext cx="8229600" cy="1143000"/>
+          </a:xfrm>
+        </p:spPr>
+        <p:txBody>
+          <a:bodyPr/>
+          <a:lstStyle/>
+          <a:p>
+            <a:r>
+              <a:rPr lang="en-US"/>
+              <a:t>Click to edit Master title style</a:t>
+            </a:r>
+            <a:endParaRPr lang="da-DK"/>
+          </a:p>
+        </p:txBody>
+      </p:sp>
+      <p:sp>
+        <p:nvSpPr>
+          <p:cNvPr id="3" name="Text Placeholder 2"/>
+          <p:cNvSpPr>
+            <a:spLocks noGrp="1"/>
+          </p:cNvSpPr>
+          <p:nvPr>
+            <p:ph type="body" sz="half" idx="1"/>
+          </p:nvPr>
+        </p:nvSpPr>
+        <p:spPr>
+          <a:xfrm>
+            <a:off x="457200" y="1600200"/>
+            <a:ext cx="4038600" cy="4525963"/>
+          </a:xfrm>
+        </p:spPr>
+        <p:txBody>
+          <a:bodyPr/>
+          <a:lstStyle/>
+          <a:p>
+            <a:pPr lvl="0"/>
+            <a:r>
+              <a:rPr lang="en-US"/>
+              <a:t>Click to edit Master text styles</a:t>
+            </a:r>
+          </a:p>
+          <a:p>
+            <a:pPr lvl="1"/>
+            <a:r>
+              <a:rPr lang="en-US"/>
+              <a:t>Second level</a:t>
+            </a:r>
+          </a:p>
+          <a:p>
+            <a:pPr lvl="2"/>
+            <a:r>
+              <a:rPr lang="en-US"/>
+              <a:t>Third level</a:t>
+            </a:r>
+          </a:p>
+          <a:p>
+            <a:pPr lvl="3"/>
+            <a:r>
+              <a:rPr lang="en-US"/>
+              <a:t>Fourth level</a:t>
+            </a:r>
+          </a:p>
+          <a:p>
+            <a:pPr lvl="4"/>
+            <a:r>
+              <a:rPr lang="en-US"/>
+              <a:t>Fifth level</a:t>
+            </a:r>
+            <a:endParaRPr lang="da-DK"/>
+          </a:p>
+        </p:txBody>
+      </p:sp>
+      <p:sp>
+        <p:nvSpPr>
+          <p:cNvPr id="4" name="Content Placeholder 3"/>
+          <p:cNvSpPr>
+            <a:spLocks noGrp="1"/>
+          </p:cNvSpPr>
+          <p:nvPr>
+            <p:ph sz="quarter" idx="2"/>
+          </p:nvPr>
+        </p:nvSpPr>
+        <p:spPr>
+          <a:xfrm>
+            <a:off x="4648200" y="1600200"/>
+            <a:ext cx="4038600" cy="2185988"/>
+          </a:xfrm>
+        </p:spPr>
+        <p:txBody>
+          <a:bodyPr/>
+          <a:lstStyle/>
+          <a:p>
+            <a:pPr lvl="0"/>
+            <a:r>
+              <a:rPr lang="en-US"/>
+              <a:t>Click to edit Master text styles</a:t>
+            </a:r>
+          </a:p>
+          <a:p>
+            <a:pPr lvl="1"/>
+            <a:r>
+              <a:rPr lang="en-US"/>
+              <a:t>Second level</a:t>
+            </a:r>
+          </a:p>
+          <a:p>
+            <a:pPr lvl="2"/>
+            <a:r>
+              <a:rPr lang="en-US"/>
+              <a:t>Third level</a:t>
+            </a:r>
+          </a:p>
+          <a:p>
+            <a:pPr lvl="3"/>
+            <a:r>
+              <a:rPr lang="en-US"/>
+              <a:t>Fourth level</a:t>
+            </a:r>
+          </a:p>
+          <a:p>
+            <a:pPr lvl="4"/>
+            <a:r>
+              <a:rPr lang="en-US"/>
+              <a:t>Fifth level</a:t>
+            </a:r>
+            <a:endParaRPr lang="da-DK"/>
+          </a:p>
+        </p:txBody>
+      </p:sp>
+      <p:sp>
+        <p:nvSpPr>
+          <p:cNvPr id="5" name="Content Placeholder 4"/>
+          <p:cNvSpPr>
+            <a:spLocks noGrp="1"/>
+          </p:cNvSpPr>
+          <p:nvPr>
+            <p:ph sz="quarter" idx="3"/>
+          </p:nvPr>
+        </p:nvSpPr>
+        <p:spPr>
+          <a:xfrm>
+            <a:off x="4648200" y="3938588"/>
+            <a:ext cx="4038600" cy="2187575"/>
+          </a:xfrm>
+        </p:spPr>
+        <p:txBody>
+          <a:bodyPr/>
+          <a:lstStyle/>
+          <a:p>
+            <a:pPr lvl="0"/>
+            <a:r>
+              <a:rPr lang="en-US"/>
+              <a:t>Click to edit Master text styles</a:t>
+            </a:r>
+          </a:p>
+          <a:p>
+            <a:pPr lvl="1"/>
+            <a:r>
+              <a:rPr lang="en-US"/>
+              <a:t>Second level</a:t>
+            </a:r>
+          </a:p>
+          <a:p>
+            <a:pPr lvl="2"/>
+            <a:r>
+              <a:rPr lang="en-US"/>
+              <a:t>Third level</a:t>
+            </a:r>
+          </a:p>
+          <a:p>
+            <a:pPr lvl="3"/>
+            <a:r>
+              <a:rPr lang="en-US"/>
+              <a:t>Fourth level</a:t>
+            </a:r>
+          </a:p>
+          <a:p>
+            <a:pPr lvl="4"/>
+            <a:r>
+              <a:rPr lang="en-US"/>
+              <a:t>Fifth level</a:t>
+            </a:r>
+            <a:endParaRPr lang="da-DK"/>
+          </a:p>
+        </p:txBody>
+      </p:sp>
+      <p:sp>
+        <p:nvSpPr>
+          <p:cNvPr id="6" name="Date Placeholder 5"/>
+          <p:cNvSpPr>
+            <a:spLocks noGrp="1"/>
+          </p:cNvSpPr>
+          <p:nvPr>
+            <p:ph type="dt" sz="half" idx="10"/>
+          </p:nvPr>
+        </p:nvSpPr>
+        <p:spPr>
+          <a:xfrm>
+            <a:off x="457200" y="6356350"/>
+            <a:ext cx="2133600" cy="365125"/>
+          </a:xfrm>
+        </p:spPr>
+        <p:txBody>
+          <a:bodyPr/>
+          <a:lstStyle>
+            <a:lvl1pPr>
+              <a:defRPr/>
+            </a:lvl1pPr>
+          </a:lstStyle>
+          <a:p>
+            <a:pPr>
+              <a:defRPr/>
+            </a:pPr>
+            <a:fld id="{E4E585A5-871E-49BE-834C-12F2EBF42A8D}" type="datetimeFigureOut">
+              <a:rPr lang="da-DK"/>
+              <a:pPr>
+                <a:defRPr/>
+              </a:pPr>
+              <a:t>10-02-2011</a:t>
+            </a:fld>
+            <a:endParaRPr lang="da-DK"/>
+          </a:p>
+        </p:txBody>
+      </p:sp>
+      <p:sp>
+        <p:nvSpPr>
+          <p:cNvPr id="7" name="Footer Placeholder 6"/>
+          <p:cNvSpPr>
+            <a:spLocks noGrp="1"/>
+          </p:cNvSpPr>
+          <p:nvPr>
+            <p:ph type="ftr" sz="quarter" idx="11"/>
+          </p:nvPr>
+        </p:nvSpPr>
+        <p:spPr>
+          <a:xfrm>
+            <a:off x="3124200" y="6356350"/>
+            <a:ext cx="2895600" cy="365125"/>
+          </a:xfrm>
+        </p:spPr>
+        <p:txBody>
+          <a:bodyPr/>
+          <a:lstStyle>
+            <a:lvl1pPr>
+              <a:defRPr/>
+            </a:lvl1pPr>
+          </a:lstStyle>
+          <a:p>
+            <a:pPr>
+              <a:defRPr/>
+            </a:pPr>
+            <a:endParaRPr lang="da-DK"/>
+          </a:p>
+        </p:txBody>
+      </p:sp>
+      <p:sp>
+        <p:nvSpPr>
+          <p:cNvPr id="8" name="Slide Number Placeholder 7"/>
+          <p:cNvSpPr>
+            <a:spLocks noGrp="1"/>
+          </p:cNvSpPr>
+          <p:nvPr>
+            <p:ph type="sldNum" sz="quarter" idx="12"/>
+          </p:nvPr>
+        </p:nvSpPr>
+        <p:spPr>
+          <a:xfrm>
+            <a:off x="6553200" y="6356350"/>
+            <a:ext cx="2133600" cy="365125"/>
+          </a:xfrm>
+        </p:spPr>
+        <p:txBody>
+          <a:bodyPr/>
+          <a:lstStyle>
+            <a:lvl1pPr>
+              <a:defRPr/>
+            </a:lvl1pPr>
+          </a:lstStyle>
+          <a:p>
+            <a:pPr>
+              <a:defRPr/>
+            </a:pPr>
+            <a:fld id="{2250788E-BC70-4CF1-80C1-6BF200B43927}" type="slidenum">
+              <a:rPr lang="da-DK"/>
+              <a:pPr>
+                <a:defRPr/>
+              </a:pPr>
+              <a:t>‹#›</a:t>
+            </a:fld>
+            <a:endParaRPr lang="da-DK"/>
+          </a:p>
+        </p:txBody>
+      </p:sp>
+    </p:spTree>
+  </p:cSld>
+  <p:clrMapOvr>
+    <a:masterClrMapping/>
+  </p:clrMapOvr>
+</p:sldLayout>
+</file>
+
+<file path=ppt/slideLayouts/slideLayout13.xml><?xml version="1.0" encoding="utf-8"?>
+<p:sldLayout xmlns:a="http://schemas.openxmlformats.org/drawingml/2006/main" xmlns:r="http://schemas.openxmlformats.org/officeDocument/2006/relationships" xmlns:p="http://schemas.openxmlformats.org/presentationml/2006/main" type="txAndObj" preserve="1">
+  <p:cSld name="Title, Text, and Content">
+    <p:spTree>
+      <p:nvGrpSpPr>
+        <p:cNvPr id="1" name=""/>
+        <p:cNvGrpSpPr/>
+        <p:nvPr/>
+      </p:nvGrpSpPr>
+      <p:grpSpPr>
+        <a:xfrm>
+          <a:off x="0" y="0"/>
+          <a:ext cx="0" cy="0"/>
+          <a:chOff x="0" y="0"/>
+          <a:chExt cx="0" cy="0"/>
+        </a:xfrm>
+      </p:grpSpPr>
+      <p:sp>
+        <p:nvSpPr>
+          <p:cNvPr id="2" name="Title 1"/>
+          <p:cNvSpPr>
+            <a:spLocks noGrp="1"/>
+          </p:cNvSpPr>
+          <p:nvPr>
+            <p:ph type="title"/>
+          </p:nvPr>
+        </p:nvSpPr>
+        <p:spPr>
+          <a:xfrm>
+            <a:off x="457200" y="274638"/>
+            <a:ext cx="8229600" cy="1143000"/>
+          </a:xfrm>
+        </p:spPr>
+        <p:txBody>
+          <a:bodyPr/>
+          <a:lstStyle/>
+          <a:p>
+            <a:r>
+              <a:rPr lang="en-US"/>
+              <a:t>Click to edit Master title style</a:t>
+            </a:r>
+            <a:endParaRPr lang="da-DK"/>
+          </a:p>
+        </p:txBody>
+      </p:sp>
+      <p:sp>
+        <p:nvSpPr>
+          <p:cNvPr id="3" name="Text Placeholder 2"/>
+          <p:cNvSpPr>
+            <a:spLocks noGrp="1"/>
+          </p:cNvSpPr>
+          <p:nvPr>
+            <p:ph type="body" sz="half" idx="1"/>
+          </p:nvPr>
+        </p:nvSpPr>
+        <p:spPr>
+          <a:xfrm>
+            <a:off x="457200" y="1600200"/>
+            <a:ext cx="4038600" cy="4525963"/>
+          </a:xfrm>
+        </p:spPr>
+        <p:txBody>
+          <a:bodyPr/>
+          <a:lstStyle/>
+          <a:p>
+            <a:pPr lvl="0"/>
+            <a:r>
+              <a:rPr lang="en-US"/>
+              <a:t>Click to edit Master text styles</a:t>
+            </a:r>
+          </a:p>
+          <a:p>
+            <a:pPr lvl="1"/>
+            <a:r>
+              <a:rPr lang="en-US"/>
+              <a:t>Second level</a:t>
+            </a:r>
+          </a:p>
+          <a:p>
+            <a:pPr lvl="2"/>
+            <a:r>
+              <a:rPr lang="en-US"/>
+              <a:t>Third level</a:t>
+            </a:r>
+          </a:p>
+          <a:p>
+            <a:pPr lvl="3"/>
+            <a:r>
+              <a:rPr lang="en-US"/>
+              <a:t>Fourth level</a:t>
+            </a:r>
+          </a:p>
+          <a:p>
+            <a:pPr lvl="4"/>
+            <a:r>
+              <a:rPr lang="en-US"/>
+              <a:t>Fifth level</a:t>
+            </a:r>
+            <a:endParaRPr lang="da-DK"/>
+          </a:p>
+        </p:txBody>
+      </p:sp>
+      <p:sp>
+        <p:nvSpPr>
+          <p:cNvPr id="4" name="Content Placeholder 3"/>
+          <p:cNvSpPr>
+            <a:spLocks noGrp="1"/>
+          </p:cNvSpPr>
+          <p:nvPr>
+            <p:ph sz="half" idx="2"/>
+          </p:nvPr>
+        </p:nvSpPr>
+        <p:spPr>
+          <a:xfrm>
+            <a:off x="4648200" y="1600200"/>
+            <a:ext cx="4038600" cy="4525963"/>
+          </a:xfrm>
+        </p:spPr>
+        <p:txBody>
+          <a:bodyPr/>
+          <a:lstStyle/>
+          <a:p>
+            <a:pPr lvl="0"/>
+            <a:r>
+              <a:rPr lang="en-US"/>
+              <a:t>Click to edit Master text styles</a:t>
+            </a:r>
+          </a:p>
+          <a:p>
+            <a:pPr lvl="1"/>
+            <a:r>
+              <a:rPr lang="en-US"/>
+              <a:t>Second level</a:t>
+            </a:r>
+          </a:p>
+          <a:p>
+            <a:pPr lvl="2"/>
+            <a:r>
+              <a:rPr lang="en-US"/>
+              <a:t>Third level</a:t>
+            </a:r>
+          </a:p>
+          <a:p>
+            <a:pPr lvl="3"/>
+            <a:r>
+              <a:rPr lang="en-US"/>
+              <a:t>Fourth level</a:t>
+            </a:r>
+          </a:p>
+          <a:p>
+            <a:pPr lvl="4"/>
+            <a:r>
+              <a:rPr lang="en-US"/>
+              <a:t>Fifth level</a:t>
+            </a:r>
+            <a:endParaRPr lang="da-DK"/>
+          </a:p>
+        </p:txBody>
+      </p:sp>
+      <p:sp>
+        <p:nvSpPr>
+          <p:cNvPr id="5" name="Date Placeholder 4"/>
+          <p:cNvSpPr>
+            <a:spLocks noGrp="1"/>
+          </p:cNvSpPr>
+          <p:nvPr>
+            <p:ph type="dt" sz="half" idx="10"/>
+          </p:nvPr>
+        </p:nvSpPr>
+        <p:spPr>
+          <a:xfrm>
+            <a:off x="457200" y="6356350"/>
+            <a:ext cx="2133600" cy="365125"/>
+          </a:xfrm>
+        </p:spPr>
+        <p:txBody>
+          <a:bodyPr/>
+          <a:lstStyle>
+            <a:lvl1pPr>
+              <a:defRPr/>
+            </a:lvl1pPr>
+          </a:lstStyle>
+          <a:p>
+            <a:pPr>
+              <a:defRPr/>
+            </a:pPr>
+            <a:fld id="{091D5921-CC2A-4C18-BF1F-24319BCD3062}" type="datetimeFigureOut">
+              <a:rPr lang="da-DK"/>
+              <a:pPr>
+                <a:defRPr/>
+              </a:pPr>
+              <a:t>10-02-2011</a:t>
+            </a:fld>
+            <a:endParaRPr lang="da-DK"/>
+          </a:p>
+        </p:txBody>
+      </p:sp>
+      <p:sp>
+        <p:nvSpPr>
+          <p:cNvPr id="6" name="Footer Placeholder 5"/>
+          <p:cNvSpPr>
+            <a:spLocks noGrp="1"/>
+          </p:cNvSpPr>
+          <p:nvPr>
+            <p:ph type="ftr" sz="quarter" idx="11"/>
+          </p:nvPr>
+        </p:nvSpPr>
+        <p:spPr>
+          <a:xfrm>
+            <a:off x="3124200" y="6356350"/>
+            <a:ext cx="2895600" cy="365125"/>
+          </a:xfrm>
+        </p:spPr>
+        <p:txBody>
+          <a:bodyPr/>
+          <a:lstStyle>
+            <a:lvl1pPr>
+              <a:defRPr/>
+            </a:lvl1pPr>
+          </a:lstStyle>
+          <a:p>
+            <a:pPr>
+              <a:defRPr/>
+            </a:pPr>
+            <a:endParaRPr lang="da-DK"/>
+          </a:p>
+        </p:txBody>
+      </p:sp>
+      <p:sp>
+        <p:nvSpPr>
+          <p:cNvPr id="7" name="Slide Number Placeholder 6"/>
+          <p:cNvSpPr>
+            <a:spLocks noGrp="1"/>
+          </p:cNvSpPr>
+          <p:nvPr>
+            <p:ph type="sldNum" sz="quarter" idx="12"/>
+          </p:nvPr>
+        </p:nvSpPr>
+        <p:spPr>
+          <a:xfrm>
+            <a:off x="6553200" y="6356350"/>
+            <a:ext cx="2133600" cy="365125"/>
+          </a:xfrm>
+        </p:spPr>
+        <p:txBody>
+          <a:bodyPr/>
+          <a:lstStyle>
+            <a:lvl1pPr>
+              <a:defRPr/>
+            </a:lvl1pPr>
+          </a:lstStyle>
+          <a:p>
+            <a:pPr>
+              <a:defRPr/>
+            </a:pPr>
+            <a:fld id="{C591659B-80D1-485F-8A4C-336D270947E1}" type="slidenum">
+              <a:rPr lang="da-DK"/>
+              <a:pPr>
+                <a:defRPr/>
+              </a:pPr>
+              <a:t>‹#›</a:t>
+            </a:fld>
+            <a:endParaRPr lang="da-DK"/>
+          </a:p>
+        </p:txBody>
+      </p:sp>
+    </p:spTree>
+  </p:cSld>
+  <p:clrMapOvr>
+    <a:masterClrMapping/>
+  </p:clrMapOvr>
+</p:sldLayout>
+</file>
+
+<file path=ppt/slideLayouts/slideLayout14.xml><?xml version="1.0" encoding="utf-8"?>
+<p:sldLayout xmlns:a="http://schemas.openxmlformats.org/drawingml/2006/main" xmlns:r="http://schemas.openxmlformats.org/officeDocument/2006/relationships" xmlns:p="http://schemas.openxmlformats.org/presentationml/2006/main" type="objOnly" preserve="1">
+  <p:cSld name="Content">
+    <p:spTree>
+      <p:nvGrpSpPr>
+        <p:cNvPr id="1" name=""/>
+        <p:cNvGrpSpPr/>
+        <p:nvPr/>
+      </p:nvGrpSpPr>
+      <p:grpSpPr>
+        <a:xfrm>
+          <a:off x="0" y="0"/>
+          <a:ext cx="0" cy="0"/>
+          <a:chOff x="0" y="0"/>
+          <a:chExt cx="0" cy="0"/>
+        </a:xfrm>
+      </p:grpSpPr>
+      <p:sp>
+        <p:nvSpPr>
+          <p:cNvPr id="2" name="Content Placeholder 1"/>
+          <p:cNvSpPr>
+            <a:spLocks noGrp="1"/>
+          </p:cNvSpPr>
+          <p:nvPr>
+            <p:ph/>
+          </p:nvPr>
+        </p:nvSpPr>
+        <p:spPr>
+          <a:xfrm>
+            <a:off x="457200" y="274638"/>
+            <a:ext cx="8229600" cy="5851525"/>
+          </a:xfrm>
+        </p:spPr>
+        <p:txBody>
+          <a:bodyPr/>
+          <a:lstStyle/>
+          <a:p>
+            <a:pPr lvl="0"/>
+            <a:r>
+              <a:rPr lang="en-US"/>
+              <a:t>Click to edit Master text styles</a:t>
+            </a:r>
+          </a:p>
+          <a:p>
+            <a:pPr lvl="1"/>
+            <a:r>
+              <a:rPr lang="en-US"/>
+              <a:t>Second level</a:t>
+            </a:r>
+          </a:p>
+          <a:p>
+            <a:pPr lvl="2"/>
+            <a:r>
+              <a:rPr lang="en-US"/>
+              <a:t>Third level</a:t>
+            </a:r>
+          </a:p>
+          <a:p>
+            <a:pPr lvl="3"/>
+            <a:r>
+              <a:rPr lang="en-US"/>
+              <a:t>Fourth level</a:t>
+            </a:r>
+          </a:p>
+          <a:p>
+            <a:pPr lvl="4"/>
+            <a:r>
+              <a:rPr lang="en-US"/>
+              <a:t>Fifth level</a:t>
+            </a:r>
+            <a:endParaRPr lang="da-DK"/>
+          </a:p>
+        </p:txBody>
+      </p:sp>
+      <p:sp>
+        <p:nvSpPr>
+          <p:cNvPr id="3" name="Date Placeholder 2"/>
+          <p:cNvSpPr>
+            <a:spLocks noGrp="1"/>
+          </p:cNvSpPr>
+          <p:nvPr>
+            <p:ph type="dt" sz="half" idx="10"/>
+          </p:nvPr>
+        </p:nvSpPr>
+        <p:spPr>
+          <a:xfrm>
+            <a:off x="457200" y="6356350"/>
+            <a:ext cx="2133600" cy="365125"/>
+          </a:xfrm>
+        </p:spPr>
+        <p:txBody>
+          <a:bodyPr/>
+          <a:lstStyle>
+            <a:lvl1pPr>
+              <a:defRPr/>
+            </a:lvl1pPr>
+          </a:lstStyle>
+          <a:p>
+            <a:pPr>
+              <a:defRPr/>
+            </a:pPr>
+            <a:fld id="{A00C734B-6FE6-45C2-8689-3A5FDB48A282}" type="datetimeFigureOut">
+              <a:rPr lang="da-DK"/>
+              <a:pPr>
+                <a:defRPr/>
+              </a:pPr>
+              <a:t>10-02-2011</a:t>
+            </a:fld>
+            <a:endParaRPr lang="da-DK"/>
+          </a:p>
+        </p:txBody>
+      </p:sp>
+      <p:sp>
+        <p:nvSpPr>
+          <p:cNvPr id="4" name="Footer Placeholder 3"/>
+          <p:cNvSpPr>
+            <a:spLocks noGrp="1"/>
+          </p:cNvSpPr>
+          <p:nvPr>
+            <p:ph type="ftr" sz="quarter" idx="11"/>
+          </p:nvPr>
+        </p:nvSpPr>
+        <p:spPr>
+          <a:xfrm>
+            <a:off x="3124200" y="6356350"/>
+            <a:ext cx="2895600" cy="365125"/>
+          </a:xfrm>
+        </p:spPr>
+        <p:txBody>
+          <a:bodyPr/>
+          <a:lstStyle>
+            <a:lvl1pPr>
+              <a:defRPr/>
+            </a:lvl1pPr>
+          </a:lstStyle>
+          <a:p>
+            <a:pPr>
+              <a:defRPr/>
+            </a:pPr>
+            <a:endParaRPr lang="da-DK"/>
+          </a:p>
+        </p:txBody>
+      </p:sp>
+      <p:sp>
+        <p:nvSpPr>
+          <p:cNvPr id="5" name="Slide Number Placeholder 4"/>
+          <p:cNvSpPr>
+            <a:spLocks noGrp="1"/>
+          </p:cNvSpPr>
+          <p:nvPr>
+            <p:ph type="sldNum" sz="quarter" idx="12"/>
+          </p:nvPr>
+        </p:nvSpPr>
+        <p:spPr>
+          <a:xfrm>
+            <a:off x="6553200" y="6356350"/>
+            <a:ext cx="2133600" cy="365125"/>
+          </a:xfrm>
+        </p:spPr>
+        <p:txBody>
+          <a:bodyPr/>
+          <a:lstStyle>
+            <a:lvl1pPr>
+              <a:defRPr/>
+            </a:lvl1pPr>
+          </a:lstStyle>
+          <a:p>
+            <a:pPr>
+              <a:defRPr/>
+            </a:pPr>
+            <a:fld id="{D5EDC695-4B4C-452F-B459-FAEF82DAF0CD}" type="slidenum">
+              <a:rPr lang="da-DK"/>
+              <a:pPr>
+                <a:defRPr/>
+              </a:pPr>
+              <a:t>‹#›</a:t>
             </a:fld>
             <a:endParaRPr lang="da-DK"/>
           </a:p>
@@ -919,7 +1720,7 @@
             <a:pPr>
               <a:defRPr/>
             </a:pPr>
-            <a:fld id="{9CC47B57-EAFE-4DF6-95AD-361A52F4AEA6}" type="datetimeFigureOut">
+            <a:fld id="{81878995-614D-4BFD-8BB6-E39D14912A44}" type="datetimeFigureOut">
               <a:rPr lang="da-DK"/>
               <a:pPr>
                 <a:defRPr/>
@@ -978,12 +1779,12 @@
             <a:pPr>
               <a:defRPr/>
             </a:pPr>
-            <a:fld id="{53B86381-8940-4191-9CA1-7087E1169B30}" type="slidenum">
+            <a:fld id="{1C1F49BF-4C66-4C2E-A93F-CA819985C369}" type="slidenum">
               <a:rPr lang="da-DK"/>
               <a:pPr>
                 <a:defRPr/>
               </a:pPr>
-              <a:t>‹nr.›</a:t>
+              <a:t>‹#›</a:t>
             </a:fld>
             <a:endParaRPr lang="da-DK"/>
           </a:p>
@@ -1187,7 +1988,7 @@
             <a:pPr>
               <a:defRPr/>
             </a:pPr>
-            <a:fld id="{38D8FB97-640A-4292-997D-31CB0F7B4B9B}" type="datetimeFigureOut">
+            <a:fld id="{95E10A75-C298-4F95-B9A6-19BA5046E4D0}" type="datetimeFigureOut">
               <a:rPr lang="da-DK"/>
               <a:pPr>
                 <a:defRPr/>
@@ -1246,12 +2047,12 @@
             <a:pPr>
               <a:defRPr/>
             </a:pPr>
-            <a:fld id="{850A572A-68D0-456F-BF22-93E7F7166529}" type="slidenum">
+            <a:fld id="{A5C81236-0ED5-4BCF-BAC1-1DC3C721B385}" type="slidenum">
               <a:rPr lang="da-DK"/>
               <a:pPr>
                 <a:defRPr/>
               </a:pPr>
-              <a:t>‹nr.›</a:t>
+              <a:t>‹#›</a:t>
             </a:fld>
             <a:endParaRPr lang="da-DK"/>
           </a:p>
@@ -1497,7 +2298,7 @@
             <a:pPr>
               <a:defRPr/>
             </a:pPr>
-            <a:fld id="{C528328B-D0A3-4E6D-8FD4-261C20DA6478}" type="datetimeFigureOut">
+            <a:fld id="{F600574A-C61A-40A9-9E21-6B92FA13CD59}" type="datetimeFigureOut">
               <a:rPr lang="da-DK"/>
               <a:pPr>
                 <a:defRPr/>
@@ -1556,12 +2357,12 @@
             <a:pPr>
               <a:defRPr/>
             </a:pPr>
-            <a:fld id="{FF7EB3E7-AD5D-4BC2-AE5F-286EC991C6C4}" type="slidenum">
+            <a:fld id="{84C21144-7751-4995-B359-90D4F2131C71}" type="slidenum">
               <a:rPr lang="da-DK"/>
               <a:pPr>
                 <a:defRPr/>
               </a:pPr>
-              <a:t>‹nr.›</a:t>
+              <a:t>‹#›</a:t>
             </a:fld>
             <a:endParaRPr lang="da-DK"/>
           </a:p>
@@ -1941,7 +2742,7 @@
             <a:pPr>
               <a:defRPr/>
             </a:pPr>
-            <a:fld id="{FA89D207-DB3C-474E-A920-F4C2D31679FE}" type="datetimeFigureOut">
+            <a:fld id="{1D31058D-65F7-4E45-AA4E-09E6EBEA1609}" type="datetimeFigureOut">
               <a:rPr lang="da-DK"/>
               <a:pPr>
                 <a:defRPr/>
@@ -2000,12 +2801,12 @@
             <a:pPr>
               <a:defRPr/>
             </a:pPr>
-            <a:fld id="{BB7AB08F-CE14-475B-9BF1-E2F2AA758F1F}" type="slidenum">
+            <a:fld id="{9F00F99B-662C-4575-9B2D-D4E19B353EE3}" type="slidenum">
               <a:rPr lang="da-DK"/>
               <a:pPr>
                 <a:defRPr/>
               </a:pPr>
-              <a:t>‹nr.›</a:t>
+              <a:t>‹#›</a:t>
             </a:fld>
             <a:endParaRPr lang="da-DK"/>
           </a:p>
@@ -2081,7 +2882,7 @@
             <a:pPr>
               <a:defRPr/>
             </a:pPr>
-            <a:fld id="{B94CF97B-CDCD-42D8-BD6B-29F0181A3B52}" type="datetimeFigureOut">
+            <a:fld id="{C839B1E6-B46A-4F43-829B-4CB302F47B9D}" type="datetimeFigureOut">
               <a:rPr lang="da-DK"/>
               <a:pPr>
                 <a:defRPr/>
@@ -2140,12 +2941,12 @@
             <a:pPr>
               <a:defRPr/>
             </a:pPr>
-            <a:fld id="{2FE58EFE-F09F-4EC9-BCD1-ED63E1510827}" type="slidenum">
+            <a:fld id="{F7040FCF-9AAB-4B08-95A7-AECB8EAF711C}" type="slidenum">
               <a:rPr lang="da-DK"/>
               <a:pPr>
                 <a:defRPr/>
               </a:pPr>
-              <a:t>‹nr.›</a:t>
+              <a:t>‹#›</a:t>
             </a:fld>
             <a:endParaRPr lang="da-DK"/>
           </a:p>
@@ -2198,7 +2999,7 @@
             <a:pPr>
               <a:defRPr/>
             </a:pPr>
-            <a:fld id="{0CB1178D-3285-46FF-BA0E-2E5AE5529C57}" type="datetimeFigureOut">
+            <a:fld id="{BF50DBDC-0F39-4857-BC78-77CC95D480F8}" type="datetimeFigureOut">
               <a:rPr lang="da-DK"/>
               <a:pPr>
                 <a:defRPr/>
@@ -2257,12 +3058,12 @@
             <a:pPr>
               <a:defRPr/>
             </a:pPr>
-            <a:fld id="{67A6C3AC-F2B4-4577-B157-1292CFFA785A}" type="slidenum">
+            <a:fld id="{704A7813-0732-4CDF-AB19-C6B70047F5E2}" type="slidenum">
               <a:rPr lang="da-DK"/>
               <a:pPr>
                 <a:defRPr/>
               </a:pPr>
-              <a:t>‹nr.›</a:t>
+              <a:t>‹#›</a:t>
             </a:fld>
             <a:endParaRPr lang="da-DK"/>
           </a:p>
@@ -2497,7 +3298,7 @@
             <a:pPr>
               <a:defRPr/>
             </a:pPr>
-            <a:fld id="{E5D776D4-CD44-45FD-8537-3FCFF1692C47}" type="datetimeFigureOut">
+            <a:fld id="{CDA4858A-AE2A-4D1F-80B8-252E34510FD4}" type="datetimeFigureOut">
               <a:rPr lang="da-DK"/>
               <a:pPr>
                 <a:defRPr/>
@@ -2556,12 +3357,12 @@
             <a:pPr>
               <a:defRPr/>
             </a:pPr>
-            <a:fld id="{0E473375-91D6-4D36-ACA8-2E60C73940F5}" type="slidenum">
+            <a:fld id="{8D861E1E-C1C4-4370-B90D-EFA7C006FFCF}" type="slidenum">
               <a:rPr lang="da-DK"/>
               <a:pPr>
                 <a:defRPr/>
               </a:pPr>
-              <a:t>‹nr.›</a:t>
+              <a:t>‹#›</a:t>
             </a:fld>
             <a:endParaRPr lang="da-DK"/>
           </a:p>
@@ -2775,7 +3576,7 @@
             <a:pPr>
               <a:defRPr/>
             </a:pPr>
-            <a:fld id="{1A41D533-3428-4077-86A2-7020B1444B88}" type="datetimeFigureOut">
+            <a:fld id="{2696D564-FC26-4767-A6E4-765B30B6ED7E}" type="datetimeFigureOut">
               <a:rPr lang="da-DK"/>
               <a:pPr>
                 <a:defRPr/>
@@ -2834,12 +3635,12 @@
             <a:pPr>
               <a:defRPr/>
             </a:pPr>
-            <a:fld id="{B7B4CCE9-AFF0-42FC-AECE-2A446F8351C9}" type="slidenum">
+            <a:fld id="{53A634B5-BA62-4648-A9AA-1482682262AC}" type="slidenum">
               <a:rPr lang="da-DK"/>
               <a:pPr>
                 <a:defRPr/>
               </a:pPr>
-              <a:t>‹nr.›</a:t>
+              <a:t>‹#›</a:t>
             </a:fld>
             <a:endParaRPr lang="da-DK"/>
           </a:p>
@@ -3016,7 +3817,7 @@
               <a:spcAft>
                 <a:spcPts val="0"/>
               </a:spcAft>
-              <a:defRPr sz="1200" smtClean="0">
+              <a:defRPr sz="1200">
                 <a:solidFill>
                   <a:schemeClr val="tx1">
                     <a:tint val="75000"/>
@@ -3030,7 +3831,7 @@
             <a:pPr>
               <a:defRPr/>
             </a:pPr>
-            <a:fld id="{39639B59-432E-43E7-8A8E-71A45C2709BA}" type="datetimeFigureOut">
+            <a:fld id="{684D89FD-24A5-4CBB-B00D-EF970FE51FAF}" type="datetimeFigureOut">
               <a:rPr lang="da-DK"/>
               <a:pPr>
                 <a:defRPr/>
@@ -3117,7 +3918,7 @@
               <a:spcAft>
                 <a:spcPts val="0"/>
               </a:spcAft>
-              <a:defRPr sz="1200" smtClean="0">
+              <a:defRPr sz="1200">
                 <a:solidFill>
                   <a:schemeClr val="tx1">
                     <a:tint val="75000"/>
@@ -3131,12 +3932,12 @@
             <a:pPr>
               <a:defRPr/>
             </a:pPr>
-            <a:fld id="{6C699B2C-6551-43EA-98AA-14E64BF33989}" type="slidenum">
+            <a:fld id="{C1667EAC-3530-410F-A933-493376770715}" type="slidenum">
               <a:rPr lang="da-DK"/>
               <a:pPr>
                 <a:defRPr/>
               </a:pPr>
-              <a:t>‹nr.›</a:t>
+              <a:t>‹#›</a:t>
             </a:fld>
             <a:endParaRPr lang="da-DK"/>
           </a:p>
@@ -3157,10 +3958,13 @@
     <p:sldLayoutId id="2147483657" r:id="rId9"/>
     <p:sldLayoutId id="2147483658" r:id="rId10"/>
     <p:sldLayoutId id="2147483659" r:id="rId11"/>
+    <p:sldLayoutId id="2147483660" r:id="rId12"/>
+    <p:sldLayoutId id="2147483661" r:id="rId13"/>
+    <p:sldLayoutId id="2147483662" r:id="rId14"/>
   </p:sldLayoutIdLst>
   <p:txStyles>
     <p:titleStyle>
-      <a:lvl1pPr algn="ctr" rtl="0" fontAlgn="base">
+      <a:lvl1pPr algn="ctr" rtl="0" eaLnBrk="0" fontAlgn="base" hangingPunct="0">
         <a:spcBef>
           <a:spcPct val="0"/>
         </a:spcBef>
@@ -3176,7 +3980,7 @@
           <a:cs typeface="+mj-cs"/>
         </a:defRPr>
       </a:lvl1pPr>
-      <a:lvl2pPr algn="ctr" rtl="0" fontAlgn="base">
+      <a:lvl2pPr algn="ctr" rtl="0" eaLnBrk="0" fontAlgn="base" hangingPunct="0">
         <a:spcBef>
           <a:spcPct val="0"/>
         </a:spcBef>
@@ -3190,7 +3994,7 @@
           <a:latin typeface="Calibri" pitchFamily="34" charset="0"/>
         </a:defRPr>
       </a:lvl2pPr>
-      <a:lvl3pPr algn="ctr" rtl="0" fontAlgn="base">
+      <a:lvl3pPr algn="ctr" rtl="0" eaLnBrk="0" fontAlgn="base" hangingPunct="0">
         <a:spcBef>
           <a:spcPct val="0"/>
         </a:spcBef>
@@ -3204,7 +4008,7 @@
           <a:latin typeface="Calibri" pitchFamily="34" charset="0"/>
         </a:defRPr>
       </a:lvl3pPr>
-      <a:lvl4pPr algn="ctr" rtl="0" fontAlgn="base">
+      <a:lvl4pPr algn="ctr" rtl="0" eaLnBrk="0" fontAlgn="base" hangingPunct="0">
         <a:spcBef>
           <a:spcPct val="0"/>
         </a:spcBef>
@@ -3218,7 +4022,7 @@
           <a:latin typeface="Calibri" pitchFamily="34" charset="0"/>
         </a:defRPr>
       </a:lvl4pPr>
-      <a:lvl5pPr algn="ctr" rtl="0" fontAlgn="base">
+      <a:lvl5pPr algn="ctr" rtl="0" eaLnBrk="0" fontAlgn="base" hangingPunct="0">
         <a:spcBef>
           <a:spcPct val="0"/>
         </a:spcBef>
@@ -3290,7 +4094,7 @@
       </a:lvl9pPr>
     </p:titleStyle>
     <p:bodyStyle>
-      <a:lvl1pPr marL="342900" indent="-342900" algn="l" rtl="0" fontAlgn="base">
+      <a:lvl1pPr marL="342900" indent="-342900" algn="l" rtl="0" eaLnBrk="0" fontAlgn="base" hangingPunct="0">
         <a:spcBef>
           <a:spcPct val="20000"/>
         </a:spcBef>
@@ -3308,7 +4112,7 @@
           <a:cs typeface="+mn-cs"/>
         </a:defRPr>
       </a:lvl1pPr>
-      <a:lvl2pPr marL="742950" indent="-285750" algn="l" rtl="0" fontAlgn="base">
+      <a:lvl2pPr marL="742950" indent="-285750" algn="l" rtl="0" eaLnBrk="0" fontAlgn="base" hangingPunct="0">
         <a:spcBef>
           <a:spcPct val="20000"/>
         </a:spcBef>
@@ -3326,7 +4130,7 @@
           <a:cs typeface="+mn-cs"/>
         </a:defRPr>
       </a:lvl2pPr>
-      <a:lvl3pPr marL="1143000" indent="-228600" algn="l" rtl="0" fontAlgn="base">
+      <a:lvl3pPr marL="1143000" indent="-228600" algn="l" rtl="0" eaLnBrk="0" fontAlgn="base" hangingPunct="0">
         <a:spcBef>
           <a:spcPct val="20000"/>
         </a:spcBef>
@@ -3344,7 +4148,7 @@
           <a:cs typeface="+mn-cs"/>
         </a:defRPr>
       </a:lvl3pPr>
-      <a:lvl4pPr marL="1600200" indent="-228600" algn="l" rtl="0" fontAlgn="base">
+      <a:lvl4pPr marL="1600200" indent="-228600" algn="l" rtl="0" eaLnBrk="0" fontAlgn="base" hangingPunct="0">
         <a:spcBef>
           <a:spcPct val="20000"/>
         </a:spcBef>
@@ -3362,7 +4166,7 @@
           <a:cs typeface="+mn-cs"/>
         </a:defRPr>
       </a:lvl4pPr>
-      <a:lvl5pPr marL="2057400" indent="-228600" algn="l" rtl="0" fontAlgn="base">
+      <a:lvl5pPr marL="2057400" indent="-228600" algn="l" rtl="0" eaLnBrk="0" fontAlgn="base" hangingPunct="0">
         <a:spcBef>
           <a:spcPct val="20000"/>
         </a:spcBef>
@@ -3572,6 +4376,7 @@
           <a:bodyPr/>
           <a:lstStyle/>
           <a:p>
+            <a:pPr eaLnBrk="1" hangingPunct="1"/>
             <a:r>
               <a:rPr lang="da-DK" smtClean="0"/>
               <a:t>Emergency call button</a:t>
@@ -3596,7 +4401,7 @@
           </a:bodyPr>
           <a:lstStyle/>
           <a:p>
-            <a:pPr fontAlgn="auto">
+            <a:pPr eaLnBrk="1" fontAlgn="auto" hangingPunct="1">
               <a:spcAft>
                 <a:spcPts val="0"/>
               </a:spcAft>
@@ -3651,6 +4456,7 @@
           <a:bodyPr/>
           <a:lstStyle/>
           <a:p>
+            <a:pPr eaLnBrk="1" hangingPunct="1"/>
             <a:r>
               <a:rPr lang="da-DK" smtClean="0"/>
               <a:t>Læringsmålet</a:t>
@@ -3673,84 +4479,44 @@
           <a:bodyPr/>
           <a:lstStyle/>
           <a:p>
-            <a:r>
-              <a:rPr lang="da-DK" dirty="0" smtClean="0"/>
+            <a:pPr eaLnBrk="1" hangingPunct="1"/>
+            <a:r>
+              <a:rPr lang="da-DK" smtClean="0"/>
               <a:t>Forundersøgelse (SRS, </a:t>
             </a:r>
             <a:r>
-              <a:rPr lang="da-DK" i="1" dirty="0" smtClean="0"/>
+              <a:rPr lang="da-DK" i="1" smtClean="0"/>
               <a:t>DDD</a:t>
             </a:r>
             <a:r>
-              <a:rPr lang="da-DK" dirty="0" smtClean="0"/>
+              <a:rPr lang="da-DK" smtClean="0"/>
               <a:t>)</a:t>
             </a:r>
           </a:p>
           <a:p>
-            <a:r>
-              <a:rPr lang="da-DK" dirty="0" err="1" smtClean="0"/>
-              <a:t>Risk</a:t>
-            </a:r>
-            <a:r>
-              <a:rPr lang="da-DK" dirty="0" smtClean="0"/>
-              <a:t> </a:t>
-            </a:r>
-            <a:r>
-              <a:rPr lang="da-DK" dirty="0" err="1" smtClean="0"/>
-              <a:t>level</a:t>
-            </a:r>
-            <a:r>
-              <a:rPr lang="da-DK" dirty="0" smtClean="0"/>
-              <a:t> management</a:t>
-            </a:r>
-          </a:p>
-          <a:p>
-            <a:r>
-              <a:rPr lang="da-DK" dirty="0" err="1" smtClean="0"/>
-              <a:t>Synthesis</a:t>
-            </a:r>
-            <a:r>
-              <a:rPr lang="da-DK" dirty="0" smtClean="0"/>
-              <a:t> </a:t>
-            </a:r>
-            <a:r>
-              <a:rPr lang="da-DK" dirty="0" err="1" smtClean="0"/>
-              <a:t>SysML/UML</a:t>
-            </a:r>
-            <a:r>
-              <a:rPr lang="da-DK" dirty="0" smtClean="0"/>
-              <a:t> til </a:t>
-            </a:r>
-            <a:r>
-              <a:rPr lang="da-DK" dirty="0" err="1" smtClean="0"/>
-              <a:t>SystemC</a:t>
-            </a:r>
-            <a:r>
-              <a:rPr lang="da-DK" dirty="0" smtClean="0"/>
-              <a:t> simulation</a:t>
-            </a:r>
-          </a:p>
-          <a:p>
-            <a:r>
-              <a:rPr lang="da-DK" dirty="0" smtClean="0"/>
-              <a:t>Mest optimal </a:t>
-            </a:r>
-            <a:r>
-              <a:rPr lang="da-DK" dirty="0" err="1" smtClean="0"/>
-              <a:t>mapning</a:t>
-            </a:r>
-            <a:r>
-              <a:rPr lang="da-DK" dirty="0" smtClean="0"/>
-              <a:t> i forhold til </a:t>
-            </a:r>
-            <a:r>
-              <a:rPr lang="da-DK" dirty="0" err="1" smtClean="0"/>
-              <a:t>metric</a:t>
-            </a:r>
-            <a:endParaRPr lang="da-DK" dirty="0" smtClean="0"/>
-          </a:p>
-          <a:p>
-            <a:endParaRPr lang="da-DK" dirty="0" smtClean="0"/>
+            <a:pPr eaLnBrk="1" hangingPunct="1"/>
+            <a:r>
+              <a:rPr lang="da-DK" smtClean="0"/>
+              <a:t>Risk level management</a:t>
+            </a:r>
+          </a:p>
+          <a:p>
+            <a:pPr eaLnBrk="1" hangingPunct="1"/>
+            <a:r>
+              <a:rPr lang="da-DK" smtClean="0"/>
+              <a:t>Synthesis SysML/UML til SystemC simulation</a:t>
+            </a:r>
+          </a:p>
+          <a:p>
+            <a:pPr eaLnBrk="1" hangingPunct="1"/>
+            <a:r>
+              <a:rPr lang="da-DK" smtClean="0"/>
+              <a:t>Mest optimal mapning i forhold til metric</a:t>
+            </a:r>
+          </a:p>
+          <a:p>
+            <a:pPr eaLnBrk="1" hangingPunct="1"/>
+            <a:endParaRPr lang="da-DK" smtClean="0"/>
           </a:p>
         </p:txBody>
       </p:sp>
@@ -3794,6 +4560,7 @@
           <a:bodyPr/>
           <a:lstStyle/>
           <a:p>
+            <a:pPr eaLnBrk="1" hangingPunct="1"/>
             <a:r>
               <a:rPr lang="da-DK" smtClean="0"/>
               <a:t>Status</a:t>
@@ -3816,22 +4583,571 @@
           <a:bodyPr/>
           <a:lstStyle/>
           <a:p>
+            <a:pPr eaLnBrk="1" hangingPunct="1"/>
             <a:r>
               <a:rPr lang="da-DK" smtClean="0"/>
               <a:t>Krav færdige (se use-case diagram på næste slide)</a:t>
             </a:r>
           </a:p>
           <a:p>
+            <a:pPr eaLnBrk="1" hangingPunct="1"/>
             <a:r>
               <a:rPr lang="da-DK" smtClean="0"/>
               <a:t>Arkitektur design undervejs (se diagrammer på efterfølgende slides)</a:t>
             </a:r>
           </a:p>
           <a:p>
+            <a:pPr eaLnBrk="1" hangingPunct="1"/>
             <a:endParaRPr lang="da-DK" smtClean="0"/>
           </a:p>
         </p:txBody>
       </p:sp>
+    </p:spTree>
+  </p:cSld>
+  <p:clrMapOvr>
+    <a:masterClrMapping/>
+  </p:clrMapOvr>
+</p:sld>
+</file>
+
+<file path=ppt/slides/slide12.xml><?xml version="1.0" encoding="utf-8"?>
+<p:sld xmlns:a="http://schemas.openxmlformats.org/drawingml/2006/main" xmlns:r="http://schemas.openxmlformats.org/officeDocument/2006/relationships" xmlns:p="http://schemas.openxmlformats.org/presentationml/2006/main">
+  <p:cSld>
+    <p:spTree>
+      <p:nvGrpSpPr>
+        <p:cNvPr id="1" name=""/>
+        <p:cNvGrpSpPr/>
+        <p:nvPr/>
+      </p:nvGrpSpPr>
+      <p:grpSpPr>
+        <a:xfrm>
+          <a:off x="0" y="0"/>
+          <a:ext cx="0" cy="0"/>
+          <a:chOff x="0" y="0"/>
+          <a:chExt cx="0" cy="0"/>
+        </a:xfrm>
+      </p:grpSpPr>
+      <p:sp>
+        <p:nvSpPr>
+          <p:cNvPr id="25602" name="Rectangle 2"/>
+          <p:cNvSpPr>
+            <a:spLocks noGrp="1"/>
+          </p:cNvSpPr>
+          <p:nvPr>
+            <p:ph type="title"/>
+          </p:nvPr>
+        </p:nvSpPr>
+        <p:spPr/>
+        <p:txBody>
+          <a:bodyPr/>
+          <a:lstStyle/>
+          <a:p>
+            <a:r>
+              <a:rPr lang="da-DK" sz="4000" smtClean="0"/>
+              <a:t>System Engineering metode</a:t>
+            </a:r>
+            <a:br>
+              <a:rPr lang="da-DK" sz="4000" smtClean="0"/>
+            </a:br>
+            <a:r>
+              <a:rPr lang="da-DK" sz="4000" smtClean="0"/>
+              <a:t>INCOSE</a:t>
+            </a:r>
+          </a:p>
+        </p:txBody>
+      </p:sp>
+      <p:sp>
+        <p:nvSpPr>
+          <p:cNvPr id="25603" name="Rectangle 3"/>
+          <p:cNvSpPr>
+            <a:spLocks noGrp="1"/>
+          </p:cNvSpPr>
+          <p:nvPr>
+            <p:ph type="body" sz="half" idx="1"/>
+          </p:nvPr>
+        </p:nvSpPr>
+        <p:spPr>
+          <a:xfrm>
+            <a:off x="457200" y="1600200"/>
+            <a:ext cx="3035300" cy="533400"/>
+          </a:xfrm>
+        </p:spPr>
+        <p:txBody>
+          <a:bodyPr/>
+          <a:lstStyle/>
+          <a:p>
+            <a:r>
+              <a:rPr lang="en-US" sz="2800" smtClean="0"/>
+              <a:t>Context Diagram</a:t>
+            </a:r>
+          </a:p>
+        </p:txBody>
+      </p:sp>
+      <p:graphicFrame>
+        <p:nvGraphicFramePr>
+          <p:cNvPr id="25604" name="Object 4"/>
+          <p:cNvGraphicFramePr>
+            <a:graphicFrameLocks noChangeAspect="1"/>
+          </p:cNvGraphicFramePr>
+          <p:nvPr>
+            <p:ph sz="quarter" idx="2"/>
+          </p:nvPr>
+        </p:nvGraphicFramePr>
+        <p:xfrm>
+          <a:off x="2865438" y="1628775"/>
+          <a:ext cx="4587875" cy="4752975"/>
+        </p:xfrm>
+        <a:graphic>
+          <a:graphicData uri="http://schemas.openxmlformats.org/presentationml/2006/ole">
+            <p:oleObj spid="_x0000_s25604" name="Visio" r:id="rId3" imgW="5401242" imgH="4580476" progId="Visio.Drawing.11">
+              <p:embed/>
+            </p:oleObj>
+          </a:graphicData>
+        </a:graphic>
+      </p:graphicFrame>
+    </p:spTree>
+  </p:cSld>
+  <p:clrMapOvr>
+    <a:masterClrMapping/>
+  </p:clrMapOvr>
+</p:sld>
+</file>
+
+<file path=ppt/slides/slide13.xml><?xml version="1.0" encoding="utf-8"?>
+<p:sld xmlns:a="http://schemas.openxmlformats.org/drawingml/2006/main" xmlns:r="http://schemas.openxmlformats.org/officeDocument/2006/relationships" xmlns:p="http://schemas.openxmlformats.org/presentationml/2006/main">
+  <p:cSld>
+    <p:spTree>
+      <p:nvGrpSpPr>
+        <p:cNvPr id="1" name=""/>
+        <p:cNvGrpSpPr/>
+        <p:nvPr/>
+      </p:nvGrpSpPr>
+      <p:grpSpPr>
+        <a:xfrm>
+          <a:off x="0" y="0"/>
+          <a:ext cx="0" cy="0"/>
+          <a:chOff x="0" y="0"/>
+          <a:chExt cx="0" cy="0"/>
+        </a:xfrm>
+      </p:grpSpPr>
+      <p:sp>
+        <p:nvSpPr>
+          <p:cNvPr id="29699" name="Rectangle 3"/>
+          <p:cNvSpPr>
+            <a:spLocks noGrp="1"/>
+          </p:cNvSpPr>
+          <p:nvPr>
+            <p:ph type="body" sz="half" idx="1"/>
+          </p:nvPr>
+        </p:nvSpPr>
+        <p:spPr>
+          <a:xfrm>
+            <a:off x="457200" y="692150"/>
+            <a:ext cx="8218488" cy="5434013"/>
+          </a:xfrm>
+        </p:spPr>
+        <p:txBody>
+          <a:bodyPr/>
+          <a:lstStyle/>
+          <a:p>
+            <a:r>
+              <a:rPr lang="en-US" sz="2800" smtClean="0"/>
+              <a:t>Use cases</a:t>
+            </a:r>
+          </a:p>
+          <a:p>
+            <a:r>
+              <a:rPr lang="en-US" sz="2800" smtClean="0"/>
+              <a:t>Sequence diagrams</a:t>
+            </a:r>
+          </a:p>
+          <a:p>
+            <a:pPr>
+              <a:buFont typeface="Arial" charset="0"/>
+              <a:buNone/>
+            </a:pPr>
+            <a:endParaRPr lang="en-US" sz="2800" smtClean="0"/>
+          </a:p>
+          <a:p>
+            <a:pPr>
+              <a:buFont typeface="Arial" charset="0"/>
+              <a:buNone/>
+            </a:pPr>
+            <a:endParaRPr lang="en-US" sz="2800" smtClean="0"/>
+          </a:p>
+          <a:p>
+            <a:pPr>
+              <a:buFont typeface="Arial" charset="0"/>
+              <a:buNone/>
+            </a:pPr>
+            <a:endParaRPr lang="en-US" sz="2800" smtClean="0"/>
+          </a:p>
+          <a:p>
+            <a:pPr>
+              <a:buFont typeface="Arial" charset="0"/>
+              <a:buNone/>
+            </a:pPr>
+            <a:endParaRPr lang="en-US" sz="2800" smtClean="0"/>
+          </a:p>
+          <a:p>
+            <a:pPr>
+              <a:buFont typeface="Arial" charset="0"/>
+              <a:buNone/>
+            </a:pPr>
+            <a:endParaRPr lang="en-US" sz="2800" smtClean="0"/>
+          </a:p>
+          <a:p>
+            <a:pPr>
+              <a:buFont typeface="Arial" charset="0"/>
+              <a:buNone/>
+            </a:pPr>
+            <a:endParaRPr lang="en-US" sz="2800" smtClean="0"/>
+          </a:p>
+          <a:p>
+            <a:r>
+              <a:rPr lang="en-US" sz="2800" smtClean="0"/>
+              <a:t>System Requirement Specification (SRS)</a:t>
+            </a:r>
+          </a:p>
+          <a:p>
+            <a:endParaRPr lang="da-DK" sz="2800" smtClean="0"/>
+          </a:p>
+        </p:txBody>
+      </p:sp>
+      <p:graphicFrame>
+        <p:nvGraphicFramePr>
+          <p:cNvPr id="29700" name="Object 4"/>
+          <p:cNvGraphicFramePr>
+            <a:graphicFrameLocks noChangeAspect="1"/>
+          </p:cNvGraphicFramePr>
+          <p:nvPr>
+            <p:ph sz="half" idx="2"/>
+          </p:nvPr>
+        </p:nvGraphicFramePr>
+        <p:xfrm>
+          <a:off x="827088" y="1801813"/>
+          <a:ext cx="6913562" cy="3082925"/>
+        </p:xfrm>
+        <a:graphic>
+          <a:graphicData uri="http://schemas.openxmlformats.org/presentationml/2006/ole">
+            <p:oleObj spid="_x0000_s29700" name="Visio" r:id="rId3" imgW="7765187" imgH="3466244" progId="Visio.Drawing.11">
+              <p:embed/>
+            </p:oleObj>
+          </a:graphicData>
+        </a:graphic>
+      </p:graphicFrame>
+    </p:spTree>
+  </p:cSld>
+  <p:clrMapOvr>
+    <a:masterClrMapping/>
+  </p:clrMapOvr>
+</p:sld>
+</file>
+
+<file path=ppt/slides/slide14.xml><?xml version="1.0" encoding="utf-8"?>
+<p:sld xmlns:a="http://schemas.openxmlformats.org/drawingml/2006/main" xmlns:r="http://schemas.openxmlformats.org/officeDocument/2006/relationships" xmlns:p="http://schemas.openxmlformats.org/presentationml/2006/main">
+  <p:cSld>
+    <p:spTree>
+      <p:nvGrpSpPr>
+        <p:cNvPr id="1" name=""/>
+        <p:cNvGrpSpPr/>
+        <p:nvPr/>
+      </p:nvGrpSpPr>
+      <p:grpSpPr>
+        <a:xfrm>
+          <a:off x="0" y="0"/>
+          <a:ext cx="0" cy="0"/>
+          <a:chOff x="0" y="0"/>
+          <a:chExt cx="0" cy="0"/>
+        </a:xfrm>
+      </p:grpSpPr>
+      <p:sp>
+        <p:nvSpPr>
+          <p:cNvPr id="24578" name="Rectangle 2"/>
+          <p:cNvSpPr>
+            <a:spLocks noGrp="1"/>
+          </p:cNvSpPr>
+          <p:nvPr>
+            <p:ph type="title"/>
+          </p:nvPr>
+        </p:nvSpPr>
+        <p:spPr/>
+        <p:txBody>
+          <a:bodyPr/>
+          <a:lstStyle/>
+          <a:p>
+            <a:r>
+              <a:rPr lang="da-DK" sz="4000" smtClean="0"/>
+              <a:t>Arkitektural design </a:t>
+            </a:r>
+            <a:br>
+              <a:rPr lang="da-DK" sz="4000" smtClean="0"/>
+            </a:br>
+            <a:r>
+              <a:rPr lang="da-DK" sz="4000" smtClean="0"/>
+              <a:t>(SysML som modelerings værktøj)</a:t>
+            </a:r>
+          </a:p>
+        </p:txBody>
+      </p:sp>
+      <p:sp>
+        <p:nvSpPr>
+          <p:cNvPr id="24579" name="Rectangle 3"/>
+          <p:cNvSpPr>
+            <a:spLocks noGrp="1"/>
+          </p:cNvSpPr>
+          <p:nvPr>
+            <p:ph type="body" sz="half" idx="1"/>
+          </p:nvPr>
+        </p:nvSpPr>
+        <p:spPr/>
+        <p:txBody>
+          <a:bodyPr/>
+          <a:lstStyle/>
+          <a:p>
+            <a:endParaRPr lang="da-DK" sz="2800" smtClean="0"/>
+          </a:p>
+          <a:p>
+            <a:endParaRPr lang="da-DK" sz="2800" smtClean="0"/>
+          </a:p>
+        </p:txBody>
+      </p:sp>
+      <p:graphicFrame>
+        <p:nvGraphicFramePr>
+          <p:cNvPr id="24583" name="Object 7"/>
+          <p:cNvGraphicFramePr>
+            <a:graphicFrameLocks noChangeAspect="1"/>
+          </p:cNvGraphicFramePr>
+          <p:nvPr>
+            <p:ph sz="half" idx="2"/>
+          </p:nvPr>
+        </p:nvGraphicFramePr>
+        <p:xfrm>
+          <a:off x="1619250" y="1844675"/>
+          <a:ext cx="4752975" cy="4489450"/>
+        </p:xfrm>
+        <a:graphic>
+          <a:graphicData uri="http://schemas.openxmlformats.org/presentationml/2006/ole">
+            <p:oleObj spid="_x0000_s24583" name="Visio" r:id="rId3" imgW="3271830" imgH="3091427" progId="Visio.Drawing.11">
+              <p:embed/>
+            </p:oleObj>
+          </a:graphicData>
+        </a:graphic>
+      </p:graphicFrame>
+    </p:spTree>
+  </p:cSld>
+  <p:clrMapOvr>
+    <a:masterClrMapping/>
+  </p:clrMapOvr>
+</p:sld>
+</file>
+
+<file path=ppt/slides/slide15.xml><?xml version="1.0" encoding="utf-8"?>
+<p:sld xmlns:a="http://schemas.openxmlformats.org/drawingml/2006/main" xmlns:r="http://schemas.openxmlformats.org/officeDocument/2006/relationships" xmlns:p="http://schemas.openxmlformats.org/presentationml/2006/main">
+  <p:cSld>
+    <p:spTree>
+      <p:nvGrpSpPr>
+        <p:cNvPr id="1" name=""/>
+        <p:cNvGrpSpPr/>
+        <p:nvPr/>
+      </p:nvGrpSpPr>
+      <p:grpSpPr>
+        <a:xfrm>
+          <a:off x="0" y="0"/>
+          <a:ext cx="0" cy="0"/>
+          <a:chOff x="0" y="0"/>
+          <a:chExt cx="0" cy="0"/>
+        </a:xfrm>
+      </p:grpSpPr>
+      <p:sp>
+        <p:nvSpPr>
+          <p:cNvPr id="36867" name="Rectangle 3"/>
+          <p:cNvSpPr>
+            <a:spLocks noGrp="1"/>
+          </p:cNvSpPr>
+          <p:nvPr>
+            <p:ph type="body" sz="half" idx="1"/>
+          </p:nvPr>
+        </p:nvSpPr>
+        <p:spPr/>
+        <p:txBody>
+          <a:bodyPr/>
+          <a:lstStyle/>
+          <a:p>
+            <a:endParaRPr lang="da-DK" sz="2800" smtClean="0"/>
+          </a:p>
+          <a:p>
+            <a:pPr>
+              <a:buFont typeface="Arial" charset="0"/>
+              <a:buNone/>
+            </a:pPr>
+            <a:endParaRPr lang="da-DK" sz="2800" smtClean="0"/>
+          </a:p>
+        </p:txBody>
+      </p:sp>
+      <p:graphicFrame>
+        <p:nvGraphicFramePr>
+          <p:cNvPr id="36868" name="Object 4"/>
+          <p:cNvGraphicFramePr>
+            <a:graphicFrameLocks noChangeAspect="1"/>
+          </p:cNvGraphicFramePr>
+          <p:nvPr>
+            <p:ph sz="half" idx="2"/>
+          </p:nvPr>
+        </p:nvGraphicFramePr>
+        <p:xfrm>
+          <a:off x="1619250" y="620713"/>
+          <a:ext cx="6265863" cy="5835650"/>
+        </p:xfrm>
+        <a:graphic>
+          <a:graphicData uri="http://schemas.openxmlformats.org/presentationml/2006/ole">
+            <p:oleObj spid="_x0000_s36868" name="Visio" r:id="rId3" imgW="5251402" imgH="4891663" progId="Visio.Drawing.11">
+              <p:embed/>
+            </p:oleObj>
+          </a:graphicData>
+        </a:graphic>
+      </p:graphicFrame>
+    </p:spTree>
+  </p:cSld>
+  <p:clrMapOvr>
+    <a:masterClrMapping/>
+  </p:clrMapOvr>
+</p:sld>
+</file>
+
+<file path=ppt/slides/slide16.xml><?xml version="1.0" encoding="utf-8"?>
+<p:sld xmlns:a="http://schemas.openxmlformats.org/drawingml/2006/main" xmlns:r="http://schemas.openxmlformats.org/officeDocument/2006/relationships" xmlns:p="http://schemas.openxmlformats.org/presentationml/2006/main">
+  <p:cSld>
+    <p:spTree>
+      <p:nvGrpSpPr>
+        <p:cNvPr id="1" name=""/>
+        <p:cNvGrpSpPr/>
+        <p:nvPr/>
+      </p:nvGrpSpPr>
+      <p:grpSpPr>
+        <a:xfrm>
+          <a:off x="0" y="0"/>
+          <a:ext cx="0" cy="0"/>
+          <a:chOff x="0" y="0"/>
+          <a:chExt cx="0" cy="0"/>
+        </a:xfrm>
+      </p:grpSpPr>
+      <p:graphicFrame>
+        <p:nvGraphicFramePr>
+          <p:cNvPr id="35843" name="Object 3"/>
+          <p:cNvGraphicFramePr>
+            <a:graphicFrameLocks noChangeAspect="1"/>
+          </p:cNvGraphicFramePr>
+          <p:nvPr>
+            <p:ph idx="1"/>
+          </p:nvPr>
+        </p:nvGraphicFramePr>
+        <p:xfrm>
+          <a:off x="1187450" y="476250"/>
+          <a:ext cx="6557963" cy="5453063"/>
+        </p:xfrm>
+        <a:graphic>
+          <a:graphicData uri="http://schemas.openxmlformats.org/presentationml/2006/ole">
+            <p:oleObj spid="_x0000_s35843" name="Visio" r:id="rId3" imgW="5341678" imgH="4441604" progId="Visio.Drawing.11">
+              <p:embed/>
+            </p:oleObj>
+          </a:graphicData>
+        </a:graphic>
+      </p:graphicFrame>
+    </p:spTree>
+  </p:cSld>
+  <p:clrMapOvr>
+    <a:masterClrMapping/>
+  </p:clrMapOvr>
+</p:sld>
+</file>
+
+<file path=ppt/slides/slide17.xml><?xml version="1.0" encoding="utf-8"?>
+<p:sld xmlns:a="http://schemas.openxmlformats.org/drawingml/2006/main" xmlns:r="http://schemas.openxmlformats.org/officeDocument/2006/relationships" xmlns:p="http://schemas.openxmlformats.org/presentationml/2006/main">
+  <p:cSld>
+    <p:spTree>
+      <p:nvGrpSpPr>
+        <p:cNvPr id="1" name=""/>
+        <p:cNvGrpSpPr/>
+        <p:nvPr/>
+      </p:nvGrpSpPr>
+      <p:grpSpPr>
+        <a:xfrm>
+          <a:off x="0" y="0"/>
+          <a:ext cx="0" cy="0"/>
+          <a:chOff x="0" y="0"/>
+          <a:chExt cx="0" cy="0"/>
+        </a:xfrm>
+      </p:grpSpPr>
+      <p:graphicFrame>
+        <p:nvGraphicFramePr>
+          <p:cNvPr id="40963" name="Object 3"/>
+          <p:cNvGraphicFramePr>
+            <a:graphicFrameLocks noChangeAspect="1"/>
+          </p:cNvGraphicFramePr>
+          <p:nvPr>
+            <p:ph/>
+          </p:nvPr>
+        </p:nvGraphicFramePr>
+        <p:xfrm>
+          <a:off x="468313" y="823913"/>
+          <a:ext cx="8424862" cy="4878387"/>
+        </p:xfrm>
+        <a:graphic>
+          <a:graphicData uri="http://schemas.openxmlformats.org/presentationml/2006/ole">
+            <p:oleObj spid="_x0000_s40963" name="Visio" r:id="rId3" imgW="6691640" imgH="3875430" progId="Visio.Drawing.11">
+              <p:embed/>
+            </p:oleObj>
+          </a:graphicData>
+        </a:graphic>
+      </p:graphicFrame>
+    </p:spTree>
+  </p:cSld>
+  <p:clrMapOvr>
+    <a:masterClrMapping/>
+  </p:clrMapOvr>
+</p:sld>
+</file>
+
+<file path=ppt/slides/slide18.xml><?xml version="1.0" encoding="utf-8"?>
+<p:sld xmlns:a="http://schemas.openxmlformats.org/drawingml/2006/main" xmlns:r="http://schemas.openxmlformats.org/officeDocument/2006/relationships" xmlns:p="http://schemas.openxmlformats.org/presentationml/2006/main">
+  <p:cSld>
+    <p:spTree>
+      <p:nvGrpSpPr>
+        <p:cNvPr id="1" name=""/>
+        <p:cNvGrpSpPr/>
+        <p:nvPr/>
+      </p:nvGrpSpPr>
+      <p:grpSpPr>
+        <a:xfrm>
+          <a:off x="0" y="0"/>
+          <a:ext cx="0" cy="0"/>
+          <a:chOff x="0" y="0"/>
+          <a:chExt cx="0" cy="0"/>
+        </a:xfrm>
+      </p:grpSpPr>
+      <p:graphicFrame>
+        <p:nvGraphicFramePr>
+          <p:cNvPr id="39939" name="Object 3"/>
+          <p:cNvGraphicFramePr>
+            <a:graphicFrameLocks noChangeAspect="1"/>
+          </p:cNvGraphicFramePr>
+          <p:nvPr>
+            <p:ph/>
+          </p:nvPr>
+        </p:nvGraphicFramePr>
+        <p:xfrm>
+          <a:off x="395288" y="1625600"/>
+          <a:ext cx="8353425" cy="3149600"/>
+        </p:xfrm>
+        <a:graphic>
+          <a:graphicData uri="http://schemas.openxmlformats.org/presentationml/2006/ole">
+            <p:oleObj spid="_x0000_s39939" name="Visio" r:id="rId3" imgW="5611577" imgH="2116531" progId="Visio.Drawing.11">
+              <p:embed/>
+            </p:oleObj>
+          </a:graphicData>
+        </a:graphic>
+      </p:graphicFrame>
     </p:spTree>
   </p:cSld>
   <p:clrMapOvr>
@@ -3872,6 +5188,7 @@
           <a:bodyPr/>
           <a:lstStyle/>
           <a:p>
+            <a:pPr eaLnBrk="1" hangingPunct="1"/>
             <a:r>
               <a:rPr lang="da-DK" smtClean="0"/>
               <a:t>I dag</a:t>
@@ -3888,7 +5205,7 @@
           <p:nvPr/>
         </p:nvPicPr>
         <p:blipFill>
-          <a:blip r:embed="rId2" cstate="print"/>
+          <a:blip r:embed="rId2"/>
           <a:srcRect/>
           <a:stretch>
             <a:fillRect/>
@@ -3951,6 +5268,7 @@
           <a:bodyPr/>
           <a:lstStyle/>
           <a:p>
+            <a:pPr eaLnBrk="1" hangingPunct="1"/>
             <a:r>
               <a:rPr lang="da-DK" smtClean="0"/>
               <a:t>Problemer?</a:t>
@@ -3973,19 +5291,21 @@
           <a:bodyPr/>
           <a:lstStyle/>
           <a:p>
+            <a:pPr eaLnBrk="1" hangingPunct="1"/>
             <a:r>
               <a:rPr lang="da-DK" smtClean="0"/>
               <a:t>Højtaler/mikrofon er ikke i samme rum som personen der har brug for hjælp</a:t>
             </a:r>
           </a:p>
           <a:p>
+            <a:pPr eaLnBrk="1" hangingPunct="1"/>
             <a:r>
               <a:rPr lang="da-DK" smtClean="0"/>
               <a:t>Systemet kræver en fastnet forbindelse (dyr)</a:t>
             </a:r>
           </a:p>
           <a:p>
-            <a:pPr>
+            <a:pPr eaLnBrk="1" hangingPunct="1">
               <a:buFont typeface="Arial" charset="0"/>
               <a:buNone/>
             </a:pPr>
@@ -4033,6 +5353,7 @@
           <a:bodyPr/>
           <a:lstStyle/>
           <a:p>
+            <a:pPr eaLnBrk="1" hangingPunct="1"/>
             <a:r>
               <a:rPr lang="da-DK" smtClean="0"/>
               <a:t>Løsning</a:t>
@@ -4055,12 +5376,14 @@
           <a:bodyPr/>
           <a:lstStyle/>
           <a:p>
+            <a:pPr eaLnBrk="1" hangingPunct="1"/>
             <a:r>
               <a:rPr lang="da-DK" smtClean="0"/>
               <a:t>Flyt højtaler og mikrofon til ”knappen”.</a:t>
             </a:r>
           </a:p>
           <a:p>
+            <a:pPr eaLnBrk="1" hangingPunct="1"/>
             <a:r>
               <a:rPr lang="da-DK" smtClean="0"/>
               <a:t>Anvend en alternativ (eksisterende) kommunikationslinie.</a:t>
@@ -4108,6 +5431,7 @@
           <a:bodyPr/>
           <a:lstStyle/>
           <a:p>
+            <a:pPr eaLnBrk="1" hangingPunct="1"/>
             <a:r>
               <a:rPr lang="da-DK" smtClean="0"/>
               <a:t>Emergency call button</a:t>
@@ -4124,7 +5448,7 @@
           <p:nvPr/>
         </p:nvPicPr>
         <p:blipFill>
-          <a:blip r:embed="rId2" cstate="print"/>
+          <a:blip r:embed="rId2"/>
           <a:srcRect t="20415"/>
           <a:stretch>
             <a:fillRect/>
@@ -4187,6 +5511,7 @@
           <a:bodyPr/>
           <a:lstStyle/>
           <a:p>
+            <a:pPr eaLnBrk="1" hangingPunct="1"/>
             <a:r>
               <a:rPr lang="da-DK" smtClean="0"/>
               <a:t>Challenges</a:t>
@@ -4211,7 +5536,7 @@
           </a:bodyPr>
           <a:lstStyle/>
           <a:p>
-            <a:pPr fontAlgn="auto">
+            <a:pPr eaLnBrk="1" fontAlgn="auto" hangingPunct="1">
               <a:spcAft>
                 <a:spcPts val="0"/>
               </a:spcAft>
@@ -4238,7 +5563,7 @@
             <a:endParaRPr lang="da-DK" dirty="0" smtClean="0"/>
           </a:p>
           <a:p>
-            <a:pPr lvl="1" fontAlgn="auto">
+            <a:pPr lvl="1" eaLnBrk="1" fontAlgn="auto" hangingPunct="1">
               <a:spcAft>
                 <a:spcPts val="0"/>
               </a:spcAft>
@@ -4252,7 +5577,7 @@
             </a:r>
           </a:p>
           <a:p>
-            <a:pPr fontAlgn="auto">
+            <a:pPr eaLnBrk="1" fontAlgn="auto" hangingPunct="1">
               <a:spcAft>
                 <a:spcPts val="0"/>
               </a:spcAft>
@@ -4266,7 +5591,7 @@
             </a:r>
           </a:p>
           <a:p>
-            <a:pPr fontAlgn="auto">
+            <a:pPr eaLnBrk="1" fontAlgn="auto" hangingPunct="1">
               <a:spcAft>
                 <a:spcPts val="0"/>
               </a:spcAft>
@@ -4280,7 +5605,7 @@
             </a:r>
           </a:p>
           <a:p>
-            <a:pPr fontAlgn="auto">
+            <a:pPr eaLnBrk="1" fontAlgn="auto" hangingPunct="1">
               <a:spcAft>
                 <a:spcPts val="0"/>
               </a:spcAft>
@@ -4335,6 +5660,7 @@
           <a:bodyPr/>
           <a:lstStyle/>
           <a:p>
+            <a:pPr eaLnBrk="1" hangingPunct="1"/>
             <a:r>
               <a:rPr lang="da-DK" smtClean="0"/>
               <a:t>Projektets mål</a:t>
@@ -4357,196 +5683,50 @@
           <a:bodyPr/>
           <a:lstStyle/>
           <a:p>
-            <a:r>
-              <a:rPr lang="da-DK" dirty="0" smtClean="0"/>
-              <a:t>System arkitektur beskrevet i </a:t>
-            </a:r>
-            <a:r>
-              <a:rPr lang="da-DK" dirty="0" err="1" smtClean="0"/>
-              <a:t>SysML</a:t>
-            </a:r>
-            <a:r>
-              <a:rPr lang="da-DK" dirty="0" smtClean="0"/>
-              <a:t> (</a:t>
-            </a:r>
-            <a:r>
-              <a:rPr lang="da-DK" dirty="0" err="1" smtClean="0"/>
-              <a:t>Proof</a:t>
-            </a:r>
-            <a:r>
-              <a:rPr lang="da-DK" dirty="0" smtClean="0"/>
-              <a:t> of </a:t>
-            </a:r>
-            <a:r>
-              <a:rPr lang="da-DK" dirty="0" err="1" smtClean="0"/>
-              <a:t>concept</a:t>
-            </a:r>
-            <a:r>
-              <a:rPr lang="da-DK" dirty="0" smtClean="0"/>
-              <a:t>)</a:t>
-            </a:r>
-            <a:endParaRPr lang="da-DK" dirty="0" smtClean="0"/>
-          </a:p>
-          <a:p>
-            <a:pPr lvl="1"/>
-            <a:r>
-              <a:rPr lang="da-DK" dirty="0" smtClean="0"/>
-              <a:t>Simulering i </a:t>
-            </a:r>
-            <a:r>
-              <a:rPr lang="da-DK" dirty="0" err="1" smtClean="0"/>
-              <a:t>SystemC</a:t>
-            </a:r>
-            <a:endParaRPr lang="da-DK" dirty="0" smtClean="0"/>
-          </a:p>
-          <a:p>
-            <a:pPr lvl="1"/>
-            <a:r>
-              <a:rPr lang="da-DK" dirty="0" err="1" smtClean="0"/>
-              <a:t>Mapning</a:t>
-            </a:r>
-            <a:r>
-              <a:rPr lang="da-DK" dirty="0" smtClean="0"/>
-              <a:t> af arkitektur </a:t>
-            </a:r>
-            <a:r>
-              <a:rPr lang="da-DK" dirty="0" err="1" smtClean="0"/>
-              <a:t>udfra</a:t>
-            </a:r>
-            <a:r>
-              <a:rPr lang="da-DK" dirty="0" smtClean="0"/>
-              <a:t> simulering (</a:t>
-            </a:r>
-            <a:r>
-              <a:rPr lang="da-DK" dirty="0" err="1" smtClean="0"/>
-              <a:t>pireto/design</a:t>
-            </a:r>
-            <a:r>
-              <a:rPr lang="da-DK" dirty="0" smtClean="0"/>
-              <a:t> </a:t>
-            </a:r>
-            <a:r>
-              <a:rPr lang="da-DK" dirty="0" err="1" smtClean="0"/>
-              <a:t>space</a:t>
-            </a:r>
-            <a:r>
-              <a:rPr lang="da-DK" dirty="0" smtClean="0"/>
-              <a:t> </a:t>
-            </a:r>
-            <a:r>
-              <a:rPr lang="da-DK" dirty="0" err="1" smtClean="0"/>
-              <a:t>exploration/profilling</a:t>
-            </a:r>
-            <a:r>
-              <a:rPr lang="da-DK" dirty="0" smtClean="0"/>
-              <a:t>) </a:t>
-            </a:r>
-          </a:p>
-          <a:p>
-            <a:pPr lvl="1"/>
-            <a:r>
-              <a:rPr lang="da-DK" dirty="0" err="1" smtClean="0"/>
-              <a:t>Mapning</a:t>
-            </a:r>
-            <a:r>
-              <a:rPr lang="da-DK" dirty="0" smtClean="0"/>
-              <a:t> i forhold til </a:t>
-            </a:r>
-            <a:r>
-              <a:rPr lang="da-DK" dirty="0" err="1" smtClean="0"/>
-              <a:t>Metrics</a:t>
-            </a:r>
-            <a:r>
-              <a:rPr lang="da-DK" dirty="0" smtClean="0"/>
-              <a:t> (</a:t>
-            </a:r>
-            <a:r>
-              <a:rPr lang="da-DK" dirty="0" err="1" smtClean="0"/>
-              <a:t>quality</a:t>
-            </a:r>
-            <a:r>
-              <a:rPr lang="da-DK" dirty="0" smtClean="0"/>
-              <a:t> </a:t>
-            </a:r>
-            <a:r>
-              <a:rPr lang="da-DK" dirty="0" err="1" smtClean="0"/>
-              <a:t>attributes</a:t>
-            </a:r>
-            <a:r>
-              <a:rPr lang="da-DK" dirty="0" smtClean="0"/>
-              <a:t>)</a:t>
-            </a:r>
-          </a:p>
-          <a:p>
-            <a:r>
-              <a:rPr lang="da-DK" dirty="0" err="1" smtClean="0"/>
-              <a:t>Risk</a:t>
-            </a:r>
-            <a:r>
-              <a:rPr lang="da-DK" dirty="0" smtClean="0"/>
-              <a:t> </a:t>
-            </a:r>
-            <a:r>
-              <a:rPr lang="da-DK" dirty="0" err="1" smtClean="0"/>
-              <a:t>level</a:t>
-            </a:r>
-            <a:r>
-              <a:rPr lang="da-DK" dirty="0" smtClean="0"/>
-              <a:t> management (</a:t>
-            </a:r>
-            <a:r>
-              <a:rPr lang="da-DK" dirty="0" err="1" smtClean="0"/>
-              <a:t>Can</a:t>
-            </a:r>
-            <a:r>
-              <a:rPr lang="da-DK" dirty="0" smtClean="0"/>
-              <a:t> </a:t>
-            </a:r>
-            <a:r>
-              <a:rPr lang="da-DK" dirty="0" err="1" smtClean="0"/>
-              <a:t>we</a:t>
-            </a:r>
-            <a:r>
-              <a:rPr lang="da-DK" dirty="0" smtClean="0"/>
-              <a:t> deliver, Time to </a:t>
-            </a:r>
-            <a:r>
-              <a:rPr lang="da-DK" dirty="0" err="1" smtClean="0"/>
-              <a:t>market</a:t>
-            </a:r>
-            <a:r>
-              <a:rPr lang="da-DK" dirty="0" smtClean="0"/>
-              <a:t>)</a:t>
-            </a:r>
-          </a:p>
-          <a:p>
-            <a:r>
-              <a:rPr lang="da-DK" dirty="0" err="1" smtClean="0"/>
-              <a:t>Battery</a:t>
-            </a:r>
-            <a:r>
-              <a:rPr lang="da-DK" dirty="0" smtClean="0"/>
-              <a:t> </a:t>
-            </a:r>
-            <a:r>
-              <a:rPr lang="da-DK" dirty="0" err="1" smtClean="0"/>
-              <a:t>life</a:t>
-            </a:r>
-            <a:r>
-              <a:rPr lang="da-DK" dirty="0" smtClean="0"/>
-              <a:t> </a:t>
-            </a:r>
-            <a:r>
-              <a:rPr lang="da-DK" dirty="0" err="1" smtClean="0"/>
-              <a:t>evaluation</a:t>
-            </a:r>
-            <a:r>
-              <a:rPr lang="da-DK" dirty="0" smtClean="0"/>
-              <a:t>.</a:t>
-            </a:r>
-          </a:p>
-          <a:p>
-            <a:endParaRPr lang="da-DK" dirty="0" smtClean="0"/>
+            <a:pPr eaLnBrk="1" hangingPunct="1"/>
+            <a:r>
+              <a:rPr lang="da-DK" smtClean="0"/>
+              <a:t>System arkitektur beskrevet i SysML (Proof of concept)</a:t>
+            </a:r>
+          </a:p>
+          <a:p>
+            <a:pPr lvl="1" eaLnBrk="1" hangingPunct="1"/>
+            <a:r>
+              <a:rPr lang="da-DK" smtClean="0"/>
+              <a:t>Simulering i SystemC</a:t>
+            </a:r>
+          </a:p>
+          <a:p>
+            <a:pPr lvl="1" eaLnBrk="1" hangingPunct="1"/>
+            <a:r>
+              <a:rPr lang="da-DK" smtClean="0"/>
+              <a:t>Mapning af arkitektur udfra simulering (pireto/design space exploration/profilling) </a:t>
+            </a:r>
+          </a:p>
+          <a:p>
+            <a:pPr lvl="1" eaLnBrk="1" hangingPunct="1"/>
+            <a:r>
+              <a:rPr lang="da-DK" smtClean="0"/>
+              <a:t>Mapning i forhold til Metrics (quality attributes)</a:t>
+            </a:r>
+          </a:p>
+          <a:p>
+            <a:pPr eaLnBrk="1" hangingPunct="1"/>
+            <a:r>
+              <a:rPr lang="da-DK" smtClean="0"/>
+              <a:t>Risk level management (Can we deliver, Time to market)</a:t>
+            </a:r>
+          </a:p>
+          <a:p>
+            <a:pPr eaLnBrk="1" hangingPunct="1"/>
+            <a:r>
+              <a:rPr lang="da-DK" smtClean="0"/>
+              <a:t>Battery life evaluation.</a:t>
+            </a:r>
+          </a:p>
+          <a:p>
+            <a:pPr eaLnBrk="1" hangingPunct="1"/>
+            <a:endParaRPr lang="da-DK" smtClean="0"/>
           </a:p>
         </p:txBody>
       </p:sp>
@@ -4590,6 +5770,7 @@
           <a:bodyPr/>
           <a:lstStyle/>
           <a:p>
+            <a:pPr eaLnBrk="1" hangingPunct="1"/>
             <a:r>
               <a:rPr lang="da-DK" smtClean="0"/>
               <a:t>Hvordan når vi vores mål?</a:t>
@@ -4612,131 +5793,71 @@
           <a:bodyPr/>
           <a:lstStyle/>
           <a:p>
-            <a:pPr marL="514350" indent="-514350">
+            <a:pPr marL="514350" indent="-514350" eaLnBrk="1" hangingPunct="1">
               <a:buFont typeface="Calibri" pitchFamily="34" charset="0"/>
               <a:buAutoNum type="arabicPeriod"/>
             </a:pPr>
             <a:r>
-              <a:rPr lang="da-DK" dirty="0" smtClean="0"/>
+              <a:rPr lang="da-DK" smtClean="0"/>
               <a:t>Projektoplæg.</a:t>
             </a:r>
           </a:p>
           <a:p>
-            <a:pPr marL="514350" indent="-514350">
+            <a:pPr marL="514350" indent="-514350" eaLnBrk="1" hangingPunct="1">
               <a:buFont typeface="Calibri" pitchFamily="34" charset="0"/>
               <a:buAutoNum type="arabicPeriod"/>
             </a:pPr>
             <a:r>
-              <a:rPr lang="da-DK" dirty="0" err="1" smtClean="0"/>
-              <a:t>Use</a:t>
-            </a:r>
-            <a:r>
-              <a:rPr lang="da-DK" dirty="0" smtClean="0"/>
-              <a:t> case krav og </a:t>
-            </a:r>
-            <a:r>
-              <a:rPr lang="da-DK" dirty="0" err="1" smtClean="0"/>
-              <a:t>non-funktionel</a:t>
-            </a:r>
-            <a:r>
-              <a:rPr lang="da-DK" dirty="0" smtClean="0"/>
-              <a:t> tabel.</a:t>
-            </a:r>
-          </a:p>
-          <a:p>
-            <a:pPr marL="514350" indent="-514350">
+              <a:rPr lang="da-DK" smtClean="0"/>
+              <a:t>Use case krav og non-funktionel tabel.</a:t>
+            </a:r>
+          </a:p>
+          <a:p>
+            <a:pPr marL="514350" indent="-514350" eaLnBrk="1" hangingPunct="1">
               <a:buFont typeface="Calibri" pitchFamily="34" charset="0"/>
               <a:buAutoNum type="arabicPeriod"/>
             </a:pPr>
             <a:r>
-              <a:rPr lang="da-DK" dirty="0" err="1" smtClean="0"/>
-              <a:t>SysML</a:t>
-            </a:r>
-            <a:r>
-              <a:rPr lang="da-DK" dirty="0" smtClean="0"/>
-              <a:t> til arkitektur design.</a:t>
-            </a:r>
-          </a:p>
-          <a:p>
-            <a:pPr marL="514350" indent="-514350">
+              <a:rPr lang="da-DK" smtClean="0"/>
+              <a:t>SysML til arkitektur design.</a:t>
+            </a:r>
+          </a:p>
+          <a:p>
+            <a:pPr marL="514350" indent="-514350" eaLnBrk="1" hangingPunct="1">
               <a:buFont typeface="Calibri" pitchFamily="34" charset="0"/>
               <a:buAutoNum type="arabicPeriod"/>
             </a:pPr>
             <a:r>
-              <a:rPr lang="da-DK" dirty="0" smtClean="0"/>
-              <a:t>Alternative </a:t>
-            </a:r>
-            <a:r>
-              <a:rPr lang="da-DK" dirty="0" err="1" smtClean="0"/>
-              <a:t>mapninger</a:t>
-            </a:r>
-            <a:r>
-              <a:rPr lang="da-DK" dirty="0" smtClean="0"/>
-              <a:t> af </a:t>
-            </a:r>
-            <a:r>
-              <a:rPr lang="da-DK" dirty="0" err="1" smtClean="0"/>
-              <a:t>arkitekture</a:t>
-            </a:r>
-            <a:r>
-              <a:rPr lang="da-DK" dirty="0" smtClean="0"/>
-              <a:t> (</a:t>
-            </a:r>
-            <a:r>
-              <a:rPr lang="da-DK" dirty="0" err="1" smtClean="0"/>
-              <a:t>Pereto</a:t>
-            </a:r>
-            <a:r>
-              <a:rPr lang="da-DK" dirty="0" smtClean="0"/>
-              <a:t> points and design </a:t>
-            </a:r>
-            <a:r>
-              <a:rPr lang="da-DK" dirty="0" err="1" smtClean="0"/>
-              <a:t>space</a:t>
-            </a:r>
-            <a:r>
-              <a:rPr lang="da-DK" dirty="0" smtClean="0"/>
-              <a:t> </a:t>
-            </a:r>
-            <a:r>
-              <a:rPr lang="da-DK" dirty="0" err="1" smtClean="0"/>
-              <a:t>exploration</a:t>
-            </a:r>
-            <a:r>
-              <a:rPr lang="da-DK" dirty="0" smtClean="0"/>
-              <a:t>)</a:t>
-            </a:r>
-          </a:p>
-          <a:p>
-            <a:pPr marL="514350" indent="-514350">
+              <a:rPr lang="da-DK" smtClean="0"/>
+              <a:t>Alternative mapninger af arkitekture (Pereto points and design space exploration)</a:t>
+            </a:r>
+          </a:p>
+          <a:p>
+            <a:pPr marL="514350" indent="-514350" eaLnBrk="1" hangingPunct="1">
               <a:buFont typeface="Calibri" pitchFamily="34" charset="0"/>
               <a:buAutoNum type="arabicPeriod"/>
             </a:pPr>
             <a:r>
-              <a:rPr lang="da-DK" dirty="0" err="1" smtClean="0"/>
-              <a:t>SystemC</a:t>
-            </a:r>
-            <a:r>
-              <a:rPr lang="da-DK" dirty="0" smtClean="0"/>
-              <a:t> til simulering og evaluering af alternative arkitekturer.</a:t>
-            </a:r>
-          </a:p>
-          <a:p>
-            <a:pPr marL="514350" indent="-514350">
+              <a:rPr lang="da-DK" smtClean="0"/>
+              <a:t>SystemC til simulering og evaluering af alternative arkitekturer.</a:t>
+            </a:r>
+          </a:p>
+          <a:p>
+            <a:pPr marL="514350" indent="-514350" eaLnBrk="1" hangingPunct="1">
               <a:buFont typeface="Calibri" pitchFamily="34" charset="0"/>
               <a:buAutoNum type="arabicPeriod"/>
             </a:pPr>
             <a:r>
-              <a:rPr lang="da-DK" dirty="0" smtClean="0"/>
+              <a:rPr lang="da-DK" smtClean="0"/>
               <a:t>Konklusion</a:t>
             </a:r>
           </a:p>
           <a:p>
-            <a:pPr marL="514350" indent="-514350">
+            <a:pPr marL="514350" indent="-514350" eaLnBrk="1" hangingPunct="1">
               <a:buFont typeface="Calibri" pitchFamily="34" charset="0"/>
               <a:buAutoNum type="arabicPeriod"/>
             </a:pPr>
-            <a:endParaRPr lang="da-DK" dirty="0" smtClean="0"/>
+            <a:endParaRPr lang="da-DK" smtClean="0"/>
           </a:p>
         </p:txBody>
       </p:sp>
@@ -4780,6 +5901,7 @@
           <a:bodyPr/>
           <a:lstStyle/>
           <a:p>
+            <a:pPr eaLnBrk="1" hangingPunct="1"/>
             <a:r>
               <a:rPr lang="da-DK" smtClean="0"/>
               <a:t>Aflevering</a:t>
@@ -4802,30 +5924,35 @@
           <a:bodyPr/>
           <a:lstStyle/>
           <a:p>
+            <a:pPr eaLnBrk="1" hangingPunct="1"/>
             <a:r>
               <a:rPr lang="da-DK" smtClean="0"/>
               <a:t>Arkitektur design som SysML diagrammer.</a:t>
             </a:r>
           </a:p>
           <a:p>
+            <a:pPr eaLnBrk="1" hangingPunct="1"/>
             <a:r>
               <a:rPr lang="da-DK" smtClean="0"/>
               <a:t>Evaluering af arkitektur mapninger med SystemC</a:t>
             </a:r>
           </a:p>
           <a:p>
+            <a:pPr eaLnBrk="1" hangingPunct="1"/>
             <a:r>
               <a:rPr lang="da-DK" smtClean="0"/>
               <a:t>Anbefalet mapning med rationale</a:t>
             </a:r>
           </a:p>
           <a:p>
+            <a:pPr eaLnBrk="1" hangingPunct="1"/>
             <a:r>
               <a:rPr lang="da-DK" smtClean="0"/>
               <a:t>Evaluering af process og metoder</a:t>
             </a:r>
           </a:p>
           <a:p>
+            <a:pPr eaLnBrk="1" hangingPunct="1"/>
             <a:r>
               <a:rPr lang="da-DK" smtClean="0"/>
               <a:t>Konklusion</a:t>

</xml_diff>

<commit_message>
Updating presentation with jpg of IBD
</commit_message>
<xml_diff>
--- a/syseng_hwco/proj/Artifact/Presentations/Presentation_11_02_11.pptx
+++ b/syseng_hwco/proj/Artifact/Presentations/Presentation_11_02_11.pptx
@@ -404,7 +404,7 @@
               <a:pPr>
                 <a:defRPr/>
               </a:pPr>
-              <a:t>‹#›</a:t>
+              <a:t>‹nr.›</a:t>
             </a:fld>
             <a:endParaRPr lang="da-DK"/>
           </a:p>
@@ -596,7 +596,7 @@
               <a:pPr>
                 <a:defRPr/>
               </a:pPr>
-              <a:t>‹#›</a:t>
+              <a:t>‹nr.›</a:t>
             </a:fld>
             <a:endParaRPr lang="da-DK"/>
           </a:p>
@@ -798,7 +798,7 @@
               <a:pPr>
                 <a:defRPr/>
               </a:pPr>
-              <a:t>‹#›</a:t>
+              <a:t>‹nr.›</a:t>
             </a:fld>
             <a:endParaRPr lang="da-DK"/>
           </a:p>
@@ -1114,7 +1114,7 @@
               <a:pPr>
                 <a:defRPr/>
               </a:pPr>
-              <a:t>‹#›</a:t>
+              <a:t>‹nr.›</a:t>
             </a:fld>
             <a:endParaRPr lang="da-DK"/>
           </a:p>
@@ -1373,7 +1373,7 @@
               <a:pPr>
                 <a:defRPr/>
               </a:pPr>
-              <a:t>‹#›</a:t>
+              <a:t>‹nr.›</a:t>
             </a:fld>
             <a:endParaRPr lang="da-DK"/>
           </a:p>
@@ -1547,7 +1547,7 @@
               <a:pPr>
                 <a:defRPr/>
               </a:pPr>
-              <a:t>‹#›</a:t>
+              <a:t>‹nr.›</a:t>
             </a:fld>
             <a:endParaRPr lang="da-DK"/>
           </a:p>
@@ -1739,7 +1739,7 @@
               <a:pPr>
                 <a:defRPr/>
               </a:pPr>
-              <a:t>‹#›</a:t>
+              <a:t>‹nr.›</a:t>
             </a:fld>
             <a:endParaRPr lang="da-DK"/>
           </a:p>
@@ -2007,7 +2007,7 @@
               <a:pPr>
                 <a:defRPr/>
               </a:pPr>
-              <a:t>‹#›</a:t>
+              <a:t>‹nr.›</a:t>
             </a:fld>
             <a:endParaRPr lang="da-DK"/>
           </a:p>
@@ -2317,7 +2317,7 @@
               <a:pPr>
                 <a:defRPr/>
               </a:pPr>
-              <a:t>‹#›</a:t>
+              <a:t>‹nr.›</a:t>
             </a:fld>
             <a:endParaRPr lang="da-DK"/>
           </a:p>
@@ -2761,7 +2761,7 @@
               <a:pPr>
                 <a:defRPr/>
               </a:pPr>
-              <a:t>‹#›</a:t>
+              <a:t>‹nr.›</a:t>
             </a:fld>
             <a:endParaRPr lang="da-DK"/>
           </a:p>
@@ -2901,7 +2901,7 @@
               <a:pPr>
                 <a:defRPr/>
               </a:pPr>
-              <a:t>‹#›</a:t>
+              <a:t>‹nr.›</a:t>
             </a:fld>
             <a:endParaRPr lang="da-DK"/>
           </a:p>
@@ -3018,7 +3018,7 @@
               <a:pPr>
                 <a:defRPr/>
               </a:pPr>
-              <a:t>‹#›</a:t>
+              <a:t>‹nr.›</a:t>
             </a:fld>
             <a:endParaRPr lang="da-DK"/>
           </a:p>
@@ -3317,7 +3317,7 @@
               <a:pPr>
                 <a:defRPr/>
               </a:pPr>
-              <a:t>‹#›</a:t>
+              <a:t>‹nr.›</a:t>
             </a:fld>
             <a:endParaRPr lang="da-DK"/>
           </a:p>
@@ -3595,7 +3595,7 @@
               <a:pPr>
                 <a:defRPr/>
               </a:pPr>
-              <a:t>‹#›</a:t>
+              <a:t>‹nr.›</a:t>
             </a:fld>
             <a:endParaRPr lang="da-DK"/>
           </a:p>
@@ -3892,7 +3892,7 @@
               <a:pPr>
                 <a:defRPr/>
               </a:pPr>
-              <a:t>‹#›</a:t>
+              <a:t>‹nr.›</a:t>
             </a:fld>
             <a:endParaRPr lang="da-DK"/>
           </a:p>
@@ -5043,28 +5043,32 @@
           <a:chExt cx="0" cy="0"/>
         </a:xfrm>
       </p:grpSpPr>
-      <p:graphicFrame>
-        <p:nvGraphicFramePr>
-          <p:cNvPr id="35843" name="Object 3"/>
-          <p:cNvGraphicFramePr>
-            <a:graphicFrameLocks noChangeAspect="1"/>
-          </p:cNvGraphicFramePr>
-          <p:nvPr>
-            <p:ph idx="1"/>
-          </p:nvPr>
-        </p:nvGraphicFramePr>
-        <p:xfrm>
-          <a:off x="1187450" y="476250"/>
-          <a:ext cx="6557963" cy="5453063"/>
-        </p:xfrm>
-        <a:graphic>
-          <a:graphicData uri="http://schemas.openxmlformats.org/presentationml/2006/ole">
-            <p:oleObj spid="_x0000_s35843" name="Visio" r:id="rId3" imgW="5341678" imgH="4441604" progId="Visio.Drawing.11">
-              <p:embed/>
-            </p:oleObj>
-          </a:graphicData>
-        </a:graphic>
-      </p:graphicFrame>
+      <p:pic>
+        <p:nvPicPr>
+          <p:cNvPr id="35844" name="Picture 4" descr="C:\Documents and Settings\Poder Conultancy\Dokumenter\school\masterofit2009\syseng_hwco\proj\Artifact\Diagrams\test.jpg"/>
+          <p:cNvPicPr>
+            <a:picLocks noChangeAspect="1" noChangeArrowheads="1"/>
+          </p:cNvPicPr>
+          <p:nvPr/>
+        </p:nvPicPr>
+        <p:blipFill>
+          <a:blip r:embed="rId2" cstate="print"/>
+          <a:srcRect/>
+          <a:stretch>
+            <a:fillRect/>
+          </a:stretch>
+        </p:blipFill>
+        <p:spPr bwMode="auto">
+          <a:xfrm>
+            <a:off x="971600" y="332656"/>
+            <a:ext cx="7416824" cy="6154479"/>
+          </a:xfrm>
+          <a:prstGeom prst="rect">
+            <a:avLst/>
+          </a:prstGeom>
+          <a:noFill/>
+        </p:spPr>
+      </p:pic>
     </p:spTree>
   </p:cSld>
   <p:clrMapOvr>
@@ -5216,7 +5220,7 @@
           <p:nvPr/>
         </p:nvPicPr>
         <p:blipFill>
-          <a:blip r:embed="rId2"/>
+          <a:blip r:embed="rId2" cstate="print"/>
           <a:srcRect/>
           <a:stretch>
             <a:fillRect/>
@@ -5459,7 +5463,7 @@
           <p:nvPr/>
         </p:nvPicPr>
         <p:blipFill>
-          <a:blip r:embed="rId2"/>
+          <a:blip r:embed="rId2" cstate="print"/>
           <a:srcRect t="20415"/>
           <a:stretch>
             <a:fillRect/>

</xml_diff>

<commit_message>
Updating diagram so it is not strange because of visio
</commit_message>
<xml_diff>
--- a/syseng_hwco/proj/Artifact/Presentations/Presentation_11_02_11.pptx
+++ b/syseng_hwco/proj/Artifact/Presentations/Presentation_11_02_11.pptx
@@ -404,7 +404,7 @@
               <a:pPr>
                 <a:defRPr/>
               </a:pPr>
-              <a:t>‹#›</a:t>
+              <a:t>‹nr.›</a:t>
             </a:fld>
             <a:endParaRPr lang="da-DK"/>
           </a:p>
@@ -596,7 +596,7 @@
               <a:pPr>
                 <a:defRPr/>
               </a:pPr>
-              <a:t>‹#›</a:t>
+              <a:t>‹nr.›</a:t>
             </a:fld>
             <a:endParaRPr lang="da-DK"/>
           </a:p>
@@ -798,7 +798,7 @@
               <a:pPr>
                 <a:defRPr/>
               </a:pPr>
-              <a:t>‹#›</a:t>
+              <a:t>‹nr.›</a:t>
             </a:fld>
             <a:endParaRPr lang="da-DK"/>
           </a:p>
@@ -1114,7 +1114,7 @@
               <a:pPr>
                 <a:defRPr/>
               </a:pPr>
-              <a:t>‹#›</a:t>
+              <a:t>‹nr.›</a:t>
             </a:fld>
             <a:endParaRPr lang="da-DK"/>
           </a:p>
@@ -1373,7 +1373,7 @@
               <a:pPr>
                 <a:defRPr/>
               </a:pPr>
-              <a:t>‹#›</a:t>
+              <a:t>‹nr.›</a:t>
             </a:fld>
             <a:endParaRPr lang="da-DK"/>
           </a:p>
@@ -1547,7 +1547,7 @@
               <a:pPr>
                 <a:defRPr/>
               </a:pPr>
-              <a:t>‹#›</a:t>
+              <a:t>‹nr.›</a:t>
             </a:fld>
             <a:endParaRPr lang="da-DK"/>
           </a:p>
@@ -1739,7 +1739,7 @@
               <a:pPr>
                 <a:defRPr/>
               </a:pPr>
-              <a:t>‹#›</a:t>
+              <a:t>‹nr.›</a:t>
             </a:fld>
             <a:endParaRPr lang="da-DK"/>
           </a:p>
@@ -2007,7 +2007,7 @@
               <a:pPr>
                 <a:defRPr/>
               </a:pPr>
-              <a:t>‹#›</a:t>
+              <a:t>‹nr.›</a:t>
             </a:fld>
             <a:endParaRPr lang="da-DK"/>
           </a:p>
@@ -2317,7 +2317,7 @@
               <a:pPr>
                 <a:defRPr/>
               </a:pPr>
-              <a:t>‹#›</a:t>
+              <a:t>‹nr.›</a:t>
             </a:fld>
             <a:endParaRPr lang="da-DK"/>
           </a:p>
@@ -2761,7 +2761,7 @@
               <a:pPr>
                 <a:defRPr/>
               </a:pPr>
-              <a:t>‹#›</a:t>
+              <a:t>‹nr.›</a:t>
             </a:fld>
             <a:endParaRPr lang="da-DK"/>
           </a:p>
@@ -2901,7 +2901,7 @@
               <a:pPr>
                 <a:defRPr/>
               </a:pPr>
-              <a:t>‹#›</a:t>
+              <a:t>‹nr.›</a:t>
             </a:fld>
             <a:endParaRPr lang="da-DK"/>
           </a:p>
@@ -3018,7 +3018,7 @@
               <a:pPr>
                 <a:defRPr/>
               </a:pPr>
-              <a:t>‹#›</a:t>
+              <a:t>‹nr.›</a:t>
             </a:fld>
             <a:endParaRPr lang="da-DK"/>
           </a:p>
@@ -3317,7 +3317,7 @@
               <a:pPr>
                 <a:defRPr/>
               </a:pPr>
-              <a:t>‹#›</a:t>
+              <a:t>‹nr.›</a:t>
             </a:fld>
             <a:endParaRPr lang="da-DK"/>
           </a:p>
@@ -3595,7 +3595,7 @@
               <a:pPr>
                 <a:defRPr/>
               </a:pPr>
-              <a:t>‹#›</a:t>
+              <a:t>‹nr.›</a:t>
             </a:fld>
             <a:endParaRPr lang="da-DK"/>
           </a:p>
@@ -3892,7 +3892,7 @@
               <a:pPr>
                 <a:defRPr/>
               </a:pPr>
-              <a:t>‹#›</a:t>
+              <a:t>‹nr.›</a:t>
             </a:fld>
             <a:endParaRPr lang="da-DK"/>
           </a:p>
@@ -5050,7 +5050,7 @@
           <p:nvPr/>
         </p:nvPicPr>
         <p:blipFill>
-          <a:blip r:embed="rId2"/>
+          <a:blip r:embed="rId2" cstate="print"/>
           <a:srcRect/>
           <a:stretch>
             <a:fillRect/>
@@ -5098,28 +5098,32 @@
           <a:chExt cx="0" cy="0"/>
         </a:xfrm>
       </p:grpSpPr>
-      <p:graphicFrame>
-        <p:nvGraphicFramePr>
-          <p:cNvPr id="40963" name="Object 3"/>
-          <p:cNvGraphicFramePr>
-            <a:graphicFrameLocks noChangeAspect="1"/>
-          </p:cNvGraphicFramePr>
-          <p:nvPr>
-            <p:ph/>
-          </p:nvPr>
-        </p:nvGraphicFramePr>
-        <p:xfrm>
-          <a:off x="468313" y="823913"/>
-          <a:ext cx="8424862" cy="4878387"/>
-        </p:xfrm>
-        <a:graphic>
-          <a:graphicData uri="http://schemas.openxmlformats.org/presentationml/2006/ole">
-            <p:oleObj spid="_x0000_s40963" name="Visio" r:id="rId3" imgW="6691640" imgH="3875430" progId="Visio.Drawing.11">
-              <p:embed/>
-            </p:oleObj>
-          </a:graphicData>
-        </a:graphic>
-      </p:graphicFrame>
+      <p:pic>
+        <p:nvPicPr>
+          <p:cNvPr id="40964" name="Picture 4" descr="C:\Documents and Settings\Poder Conultancy\Dokumenter\school\masterofit2009\syseng_hwco\proj\Artifact\Diagrams\test2.jpg"/>
+          <p:cNvPicPr>
+            <a:picLocks noChangeAspect="1" noChangeArrowheads="1"/>
+          </p:cNvPicPr>
+          <p:nvPr/>
+        </p:nvPicPr>
+        <p:blipFill>
+          <a:blip r:embed="rId2" cstate="print"/>
+          <a:srcRect/>
+          <a:stretch>
+            <a:fillRect/>
+          </a:stretch>
+        </p:blipFill>
+        <p:spPr bwMode="auto">
+          <a:xfrm>
+            <a:off x="395536" y="1052736"/>
+            <a:ext cx="8233142" cy="4752528"/>
+          </a:xfrm>
+          <a:prstGeom prst="rect">
+            <a:avLst/>
+          </a:prstGeom>
+          <a:noFill/>
+        </p:spPr>
+      </p:pic>
     </p:spTree>
   </p:cSld>
   <p:clrMapOvr>
@@ -5224,7 +5228,7 @@
           <p:nvPr/>
         </p:nvPicPr>
         <p:blipFill>
-          <a:blip r:embed="rId2"/>
+          <a:blip r:embed="rId2" cstate="print"/>
           <a:srcRect/>
           <a:stretch>
             <a:fillRect/>
@@ -5467,7 +5471,7 @@
           <p:nvPr/>
         </p:nvPicPr>
         <p:blipFill>
-          <a:blip r:embed="rId2"/>
+          <a:blip r:embed="rId2" cstate="print"/>
           <a:srcRect t="20415"/>
           <a:stretch>
             <a:fillRect/>

</xml_diff>